<commit_message>
Modification and addition to more examples
</commit_message>
<xml_diff>
--- a/Presentation - Kotlin.pptx
+++ b/Presentation - Kotlin.pptx
@@ -12,12 +12,12 @@
     <p:sldId id="257" r:id="rId3"/>
     <p:sldId id="266" r:id="rId4"/>
     <p:sldId id="258" r:id="rId5"/>
-    <p:sldId id="271" r:id="rId6"/>
+    <p:sldId id="302" r:id="rId6"/>
     <p:sldId id="272" r:id="rId7"/>
     <p:sldId id="273" r:id="rId8"/>
     <p:sldId id="274" r:id="rId9"/>
     <p:sldId id="275" r:id="rId10"/>
-    <p:sldId id="276" r:id="rId11"/>
+    <p:sldId id="301" r:id="rId11"/>
     <p:sldId id="277" r:id="rId12"/>
     <p:sldId id="278" r:id="rId13"/>
     <p:sldId id="280" r:id="rId14"/>
@@ -247,7 +247,7 @@
           <a:p>
             <a:fld id="{E91C0B49-203A-412F-8B10-2DEC114FF46F}" type="datetimeFigureOut">
               <a:rPr lang="en-US" smtClean="0"/>
-              <a:t>9/4/2017</a:t>
+              <a:t>9/5/2017</a:t>
             </a:fld>
             <a:endParaRPr lang="en-US"/>
           </a:p>
@@ -672,7 +672,7 @@
     </p:spTree>
     <p:extLst>
       <p:ext uri="{BB962C8B-B14F-4D97-AF65-F5344CB8AC3E}">
-        <p14:creationId xmlns:p14="http://schemas.microsoft.com/office/powerpoint/2010/main" val="1058515054"/>
+        <p14:creationId xmlns:p14="http://schemas.microsoft.com/office/powerpoint/2010/main" val="2034535272"/>
       </p:ext>
     </p:extLst>
   </p:cSld>
@@ -1650,7 +1650,10 @@
           <a:bodyPr/>
           <a:lstStyle/>
           <a:p>
-            <a:endParaRPr lang="en-US" dirty="0"/>
+            <a:r>
+              <a:rPr lang="en-US" dirty="0"/>
+              <a:t>Will this work with OR?</a:t>
+            </a:r>
           </a:p>
         </p:txBody>
       </p:sp>
@@ -3024,7 +3027,7 @@
     </p:spTree>
     <p:extLst>
       <p:ext uri="{BB962C8B-B14F-4D97-AF65-F5344CB8AC3E}">
-        <p14:creationId xmlns:p14="http://schemas.microsoft.com/office/powerpoint/2010/main" val="1099774994"/>
+        <p14:creationId xmlns:p14="http://schemas.microsoft.com/office/powerpoint/2010/main" val="2983103393"/>
       </p:ext>
     </p:extLst>
   </p:cSld>
@@ -3517,7 +3520,7 @@
           <a:p>
             <a:fld id="{1CF5E627-4435-4E4B-A241-B784D5E98CA2}" type="datetimeFigureOut">
               <a:rPr lang="en-US" smtClean="0"/>
-              <a:t>9/4/2017</a:t>
+              <a:t>9/5/2017</a:t>
             </a:fld>
             <a:endParaRPr lang="en-US"/>
           </a:p>
@@ -3715,7 +3718,7 @@
           <a:p>
             <a:fld id="{1CF5E627-4435-4E4B-A241-B784D5E98CA2}" type="datetimeFigureOut">
               <a:rPr lang="en-US" smtClean="0"/>
-              <a:t>9/4/2017</a:t>
+              <a:t>9/5/2017</a:t>
             </a:fld>
             <a:endParaRPr lang="en-US"/>
           </a:p>
@@ -3923,7 +3926,7 @@
           <a:p>
             <a:fld id="{1CF5E627-4435-4E4B-A241-B784D5E98CA2}" type="datetimeFigureOut">
               <a:rPr lang="en-US" smtClean="0"/>
-              <a:t>9/4/2017</a:t>
+              <a:t>9/5/2017</a:t>
             </a:fld>
             <a:endParaRPr lang="en-US"/>
           </a:p>
@@ -4121,7 +4124,7 @@
           <a:p>
             <a:fld id="{1CF5E627-4435-4E4B-A241-B784D5E98CA2}" type="datetimeFigureOut">
               <a:rPr lang="en-US" smtClean="0"/>
-              <a:t>9/4/2017</a:t>
+              <a:t>9/5/2017</a:t>
             </a:fld>
             <a:endParaRPr lang="en-US"/>
           </a:p>
@@ -4396,7 +4399,7 @@
           <a:p>
             <a:fld id="{1CF5E627-4435-4E4B-A241-B784D5E98CA2}" type="datetimeFigureOut">
               <a:rPr lang="en-US" smtClean="0"/>
-              <a:t>9/4/2017</a:t>
+              <a:t>9/5/2017</a:t>
             </a:fld>
             <a:endParaRPr lang="en-US"/>
           </a:p>
@@ -4661,7 +4664,7 @@
           <a:p>
             <a:fld id="{1CF5E627-4435-4E4B-A241-B784D5E98CA2}" type="datetimeFigureOut">
               <a:rPr lang="en-US" smtClean="0"/>
-              <a:t>9/4/2017</a:t>
+              <a:t>9/5/2017</a:t>
             </a:fld>
             <a:endParaRPr lang="en-US"/>
           </a:p>
@@ -5073,7 +5076,7 @@
           <a:p>
             <a:fld id="{1CF5E627-4435-4E4B-A241-B784D5E98CA2}" type="datetimeFigureOut">
               <a:rPr lang="en-US" smtClean="0"/>
-              <a:t>9/4/2017</a:t>
+              <a:t>9/5/2017</a:t>
             </a:fld>
             <a:endParaRPr lang="en-US"/>
           </a:p>
@@ -5214,7 +5217,7 @@
           <a:p>
             <a:fld id="{1CF5E627-4435-4E4B-A241-B784D5E98CA2}" type="datetimeFigureOut">
               <a:rPr lang="en-US" smtClean="0"/>
-              <a:t>9/4/2017</a:t>
+              <a:t>9/5/2017</a:t>
             </a:fld>
             <a:endParaRPr lang="en-US"/>
           </a:p>
@@ -5327,7 +5330,7 @@
           <a:p>
             <a:fld id="{1CF5E627-4435-4E4B-A241-B784D5E98CA2}" type="datetimeFigureOut">
               <a:rPr lang="en-US" smtClean="0"/>
-              <a:t>9/4/2017</a:t>
+              <a:t>9/5/2017</a:t>
             </a:fld>
             <a:endParaRPr lang="en-US"/>
           </a:p>
@@ -5638,7 +5641,7 @@
           <a:p>
             <a:fld id="{1CF5E627-4435-4E4B-A241-B784D5E98CA2}" type="datetimeFigureOut">
               <a:rPr lang="en-US" smtClean="0"/>
-              <a:t>9/4/2017</a:t>
+              <a:t>9/5/2017</a:t>
             </a:fld>
             <a:endParaRPr lang="en-US"/>
           </a:p>
@@ -5926,7 +5929,7 @@
           <a:p>
             <a:fld id="{1CF5E627-4435-4E4B-A241-B784D5E98CA2}" type="datetimeFigureOut">
               <a:rPr lang="en-US" smtClean="0"/>
-              <a:t>9/4/2017</a:t>
+              <a:t>9/5/2017</a:t>
             </a:fld>
             <a:endParaRPr lang="en-US"/>
           </a:p>
@@ -6167,7 +6170,7 @@
           <a:p>
             <a:fld id="{1CF5E627-4435-4E4B-A241-B784D5E98CA2}" type="datetimeFigureOut">
               <a:rPr lang="en-US" smtClean="0"/>
-              <a:t>9/4/2017</a:t>
+              <a:t>9/5/2017</a:t>
             </a:fld>
             <a:endParaRPr lang="en-US"/>
           </a:p>
@@ -6612,7 +6615,7 @@
           <a:graphicData uri="http://schemas.openxmlformats.org/presentationml/2006/ole">
             <mc:AlternateContent xmlns:mc="http://schemas.openxmlformats.org/markup-compatibility/2006">
               <mc:Choice xmlns:v="urn:schemas-microsoft-com:vml" Requires="v">
-                <p:oleObj spid="_x0000_s1061" name="Image" r:id="rId4" imgW="5269680" imgH="4469760" progId="Photoshop.Image.12">
+                <p:oleObj spid="_x0000_s1070" name="Image" r:id="rId4" imgW="5269680" imgH="4469760" progId="Photoshop.Image.12">
                   <p:embed/>
                 </p:oleObj>
               </mc:Choice>
@@ -6828,43 +6831,8 @@
                 </a:solidFill>
                 <a:latin typeface="HelveticaNeue" panose="00000400000000000000" pitchFamily="2" charset="0"/>
               </a:rPr>
-              <a:t>Functions – Named Arguments</a:t>
+              <a:t>Functions – Scope</a:t>
             </a:r>
-          </a:p>
-        </p:txBody>
-      </p:sp>
-      <p:sp>
-        <p:nvSpPr>
-          <p:cNvPr id="3" name="Content Placeholder 2">
-            <a:extLst>
-              <a:ext uri="{FF2B5EF4-FFF2-40B4-BE49-F238E27FC236}">
-                <a16:creationId xmlns:a16="http://schemas.microsoft.com/office/drawing/2014/main" id="{487A6775-CCE3-4AB6-B009-67143A7AEF77}"/>
-              </a:ext>
-            </a:extLst>
-          </p:cNvPr>
-          <p:cNvSpPr>
-            <a:spLocks noGrp="1"/>
-          </p:cNvSpPr>
-          <p:nvPr>
-            <p:ph idx="1"/>
-          </p:nvPr>
-        </p:nvSpPr>
-        <p:spPr/>
-        <p:txBody>
-          <a:bodyPr>
-            <a:normAutofit/>
-          </a:bodyPr>
-          <a:lstStyle/>
-          <a:p>
-            <a:pPr marL="0" indent="0">
-              <a:buNone/>
-            </a:pPr>
-            <a:endParaRPr lang="en-US" sz="2600" dirty="0">
-              <a:latin typeface="HelveticaNeue" panose="00000400000000000000" pitchFamily="2" charset="0"/>
-            </a:endParaRPr>
-          </a:p>
-          <a:p>
-            <a:endParaRPr lang="en-US" dirty="0"/>
           </a:p>
         </p:txBody>
       </p:sp>
@@ -6882,7 +6850,7 @@
         </p:nvSpPr>
         <p:spPr>
           <a:xfrm>
-            <a:off x="1081562" y="3903524"/>
+            <a:off x="1247775" y="1690688"/>
             <a:ext cx="9696450" cy="523220"/>
           </a:xfrm>
           <a:prstGeom prst="rect">
@@ -6904,75 +6872,15 @@
               <a:rPr lang="en-US" sz="2800" dirty="0">
                 <a:latin typeface="HelveticaNeue" panose="00000400000000000000" pitchFamily="2" charset="0"/>
               </a:rPr>
-              <a:t>Function parameters can be named when called</a:t>
+              <a:t>See Example 1 -&gt; Functions</a:t>
             </a:r>
           </a:p>
         </p:txBody>
       </p:sp>
-      <p:pic>
-        <p:nvPicPr>
-          <p:cNvPr id="5" name="Picture 4">
-            <a:extLst>
-              <a:ext uri="{FF2B5EF4-FFF2-40B4-BE49-F238E27FC236}">
-                <a16:creationId xmlns:a16="http://schemas.microsoft.com/office/drawing/2014/main" id="{DC352E40-66D7-4590-BE48-9859B9B11F68}"/>
-              </a:ext>
-            </a:extLst>
-          </p:cNvPr>
-          <p:cNvPicPr>
-            <a:picLocks noChangeAspect="1"/>
-          </p:cNvPicPr>
-          <p:nvPr/>
-        </p:nvPicPr>
-        <p:blipFill>
-          <a:blip r:embed="rId3"/>
-          <a:stretch>
-            <a:fillRect/>
-          </a:stretch>
-        </p:blipFill>
-        <p:spPr>
-          <a:xfrm>
-            <a:off x="1081561" y="1660519"/>
-            <a:ext cx="10086975" cy="1971675"/>
-          </a:xfrm>
-          <a:prstGeom prst="rect">
-            <a:avLst/>
-          </a:prstGeom>
-        </p:spPr>
-      </p:pic>
-      <p:pic>
-        <p:nvPicPr>
-          <p:cNvPr id="7" name="Picture 6">
-            <a:extLst>
-              <a:ext uri="{FF2B5EF4-FFF2-40B4-BE49-F238E27FC236}">
-                <a16:creationId xmlns:a16="http://schemas.microsoft.com/office/drawing/2014/main" id="{CCFE93FB-98C6-4C1D-8248-4A0759D5DE1E}"/>
-              </a:ext>
-            </a:extLst>
-          </p:cNvPr>
-          <p:cNvPicPr>
-            <a:picLocks noChangeAspect="1"/>
-          </p:cNvPicPr>
-          <p:nvPr/>
-        </p:nvPicPr>
-        <p:blipFill>
-          <a:blip r:embed="rId4"/>
-          <a:stretch>
-            <a:fillRect/>
-          </a:stretch>
-        </p:blipFill>
-        <p:spPr>
-          <a:xfrm>
-            <a:off x="1081562" y="4809318"/>
-            <a:ext cx="10086975" cy="1238250"/>
-          </a:xfrm>
-          <a:prstGeom prst="rect">
-            <a:avLst/>
-          </a:prstGeom>
-        </p:spPr>
-      </p:pic>
     </p:spTree>
     <p:extLst>
       <p:ext uri="{BB962C8B-B14F-4D97-AF65-F5344CB8AC3E}">
-        <p14:creationId xmlns:p14="http://schemas.microsoft.com/office/powerpoint/2010/main" val="2380135745"/>
+        <p14:creationId xmlns:p14="http://schemas.microsoft.com/office/powerpoint/2010/main" val="3949938494"/>
       </p:ext>
     </p:extLst>
   </p:cSld>
@@ -7086,8 +6994,8 @@
         </p:nvSpPr>
         <p:spPr>
           <a:xfrm>
-            <a:off x="990600" y="3314701"/>
-            <a:ext cx="10515600" cy="1417319"/>
+            <a:off x="990600" y="3314702"/>
+            <a:ext cx="10515600" cy="957578"/>
           </a:xfrm>
           <a:prstGeom prst="rect">
             <a:avLst/>
@@ -7095,7 +7003,7 @@
         </p:spPr>
         <p:txBody>
           <a:bodyPr vert="horz" lIns="91440" tIns="45720" rIns="91440" bIns="45720" rtlCol="0">
-            <a:normAutofit/>
+            <a:normAutofit lnSpcReduction="10000"/>
           </a:bodyPr>
           <a:lstStyle>
             <a:lvl1pPr marL="228600" indent="-228600" algn="l" defTabSz="914400" rtl="0" eaLnBrk="1" latinLnBrk="0" hangingPunct="1">
@@ -7571,7 +7479,7 @@
                             </p:stCondLst>
                             <p:childTnLst>
                               <p:par>
-                                <p:cTn id="5" presetID="1" presetClass="entr" presetSubtype="0" fill="hold" grpId="0" nodeType="clickEffect">
+                                <p:cTn id="5" presetID="1" presetClass="entr" presetSubtype="0" fill="hold" nodeType="clickEffect">
                                   <p:stCondLst>
                                     <p:cond delay="0"/>
                                   </p:stCondLst>
@@ -7584,11 +7492,7 @@
                                           </p:stCondLst>
                                         </p:cTn>
                                         <p:tgtEl>
-                                          <p:spTgt spid="8">
-                                            <p:txEl>
-                                              <p:pRg st="0" end="0"/>
-                                            </p:txEl>
-                                          </p:spTgt>
+                                          <p:spTgt spid="4"/>
                                         </p:tgtEl>
                                         <p:attrNameLst>
                                           <p:attrName>style.visibility</p:attrName>
@@ -7633,11 +7537,83 @@
                                           </p:stCondLst>
                                         </p:cTn>
                                         <p:tgtEl>
+                                          <p:spTgt spid="8"/>
+                                        </p:tgtEl>
+                                        <p:attrNameLst>
+                                          <p:attrName>style.visibility</p:attrName>
+                                        </p:attrNameLst>
+                                      </p:cBhvr>
+                                      <p:to>
+                                        <p:strVal val="visible"/>
+                                      </p:to>
+                                    </p:set>
+                                  </p:childTnLst>
+                                </p:cTn>
+                              </p:par>
+                            </p:childTnLst>
+                          </p:cTn>
+                        </p:par>
+                      </p:childTnLst>
+                    </p:cTn>
+                  </p:par>
+                  <p:par>
+                    <p:cTn id="11" fill="hold">
+                      <p:stCondLst>
+                        <p:cond delay="indefinite"/>
+                      </p:stCondLst>
+                      <p:childTnLst>
+                        <p:par>
+                          <p:cTn id="12" fill="hold">
+                            <p:stCondLst>
+                              <p:cond delay="0"/>
+                            </p:stCondLst>
+                            <p:childTnLst>
+                              <p:par>
+                                <p:cTn id="13" presetID="1" presetClass="entr" presetSubtype="0" fill="hold" grpId="0" nodeType="clickEffect">
+                                  <p:stCondLst>
+                                    <p:cond delay="0"/>
+                                  </p:stCondLst>
+                                  <p:childTnLst>
+                                    <p:set>
+                                      <p:cBhvr>
+                                        <p:cTn id="14" dur="1" fill="hold">
+                                          <p:stCondLst>
+                                            <p:cond delay="0"/>
+                                          </p:stCondLst>
+                                        </p:cTn>
+                                        <p:tgtEl>
                                           <p:spTgt spid="10">
                                             <p:txEl>
                                               <p:pRg st="0" end="0"/>
                                             </p:txEl>
                                           </p:spTgt>
+                                        </p:tgtEl>
+                                        <p:attrNameLst>
+                                          <p:attrName>style.visibility</p:attrName>
+                                        </p:attrNameLst>
+                                      </p:cBhvr>
+                                      <p:to>
+                                        <p:strVal val="visible"/>
+                                      </p:to>
+                                    </p:set>
+                                  </p:childTnLst>
+                                </p:cTn>
+                              </p:par>
+                              <p:par>
+                                <p:cTn id="15" presetID="1" presetClass="entr" presetSubtype="0" fill="hold" nodeType="withEffect">
+                                  <p:stCondLst>
+                                    <p:cond delay="0"/>
+                                  </p:stCondLst>
+                                  <p:childTnLst>
+                                    <p:set>
+                                      <p:cBhvr>
+                                        <p:cTn id="16" dur="1" fill="hold">
+                                          <p:stCondLst>
+                                            <p:cond delay="0"/>
+                                          </p:stCondLst>
+                                        </p:cTn>
+                                        <p:tgtEl>
+                                          <p:spTgt spid="6"/>
                                         </p:tgtEl>
                                         <p:attrNameLst>
                                           <p:attrName>style.visibility</p:attrName>
@@ -7678,7 +7654,7 @@
       </p:par>
     </p:tnLst>
     <p:bldLst>
-      <p:bldP spid="8" grpId="0" build="p"/>
+      <p:bldP spid="8" grpId="0"/>
       <p:bldP spid="10" grpId="0" build="p"/>
     </p:bldLst>
   </p:timing>
@@ -8231,6 +8207,175 @@
   <p:clrMapOvr>
     <a:masterClrMapping/>
   </p:clrMapOvr>
+  <p:timing>
+    <p:tnLst>
+      <p:par>
+        <p:cTn id="1" dur="indefinite" restart="never" nodeType="tmRoot">
+          <p:childTnLst>
+            <p:seq concurrent="1" nextAc="seek">
+              <p:cTn id="2" dur="indefinite" nodeType="mainSeq">
+                <p:childTnLst>
+                  <p:par>
+                    <p:cTn id="3" fill="hold">
+                      <p:stCondLst>
+                        <p:cond delay="indefinite"/>
+                      </p:stCondLst>
+                      <p:childTnLst>
+                        <p:par>
+                          <p:cTn id="4" fill="hold">
+                            <p:stCondLst>
+                              <p:cond delay="0"/>
+                            </p:stCondLst>
+                            <p:childTnLst>
+                              <p:par>
+                                <p:cTn id="5" presetID="1" presetClass="entr" presetSubtype="0" fill="hold" grpId="0" nodeType="clickEffect">
+                                  <p:stCondLst>
+                                    <p:cond delay="0"/>
+                                  </p:stCondLst>
+                                  <p:childTnLst>
+                                    <p:set>
+                                      <p:cBhvr>
+                                        <p:cTn id="6" dur="1" fill="hold">
+                                          <p:stCondLst>
+                                            <p:cond delay="0"/>
+                                          </p:stCondLst>
+                                        </p:cTn>
+                                        <p:tgtEl>
+                                          <p:spTgt spid="8"/>
+                                        </p:tgtEl>
+                                        <p:attrNameLst>
+                                          <p:attrName>style.visibility</p:attrName>
+                                        </p:attrNameLst>
+                                      </p:cBhvr>
+                                      <p:to>
+                                        <p:strVal val="visible"/>
+                                      </p:to>
+                                    </p:set>
+                                  </p:childTnLst>
+                                </p:cTn>
+                              </p:par>
+                            </p:childTnLst>
+                          </p:cTn>
+                        </p:par>
+                      </p:childTnLst>
+                    </p:cTn>
+                  </p:par>
+                  <p:par>
+                    <p:cTn id="7" fill="hold">
+                      <p:stCondLst>
+                        <p:cond delay="indefinite"/>
+                      </p:stCondLst>
+                      <p:childTnLst>
+                        <p:par>
+                          <p:cTn id="8" fill="hold">
+                            <p:stCondLst>
+                              <p:cond delay="0"/>
+                            </p:stCondLst>
+                            <p:childTnLst>
+                              <p:par>
+                                <p:cTn id="9" presetID="1" presetClass="entr" presetSubtype="0" fill="hold" nodeType="clickEffect">
+                                  <p:stCondLst>
+                                    <p:cond delay="0"/>
+                                  </p:stCondLst>
+                                  <p:childTnLst>
+                                    <p:set>
+                                      <p:cBhvr>
+                                        <p:cTn id="10" dur="1" fill="hold">
+                                          <p:stCondLst>
+                                            <p:cond delay="0"/>
+                                          </p:stCondLst>
+                                        </p:cTn>
+                                        <p:tgtEl>
+                                          <p:spTgt spid="5"/>
+                                        </p:tgtEl>
+                                        <p:attrNameLst>
+                                          <p:attrName>style.visibility</p:attrName>
+                                        </p:attrNameLst>
+                                      </p:cBhvr>
+                                      <p:to>
+                                        <p:strVal val="visible"/>
+                                      </p:to>
+                                    </p:set>
+                                  </p:childTnLst>
+                                </p:cTn>
+                              </p:par>
+                            </p:childTnLst>
+                          </p:cTn>
+                        </p:par>
+                      </p:childTnLst>
+                    </p:cTn>
+                  </p:par>
+                  <p:par>
+                    <p:cTn id="11" fill="hold">
+                      <p:stCondLst>
+                        <p:cond delay="indefinite"/>
+                      </p:stCondLst>
+                      <p:childTnLst>
+                        <p:par>
+                          <p:cTn id="12" fill="hold">
+                            <p:stCondLst>
+                              <p:cond delay="0"/>
+                            </p:stCondLst>
+                            <p:childTnLst>
+                              <p:par>
+                                <p:cTn id="13" presetID="1" presetClass="entr" presetSubtype="0" fill="hold" grpId="0" nodeType="clickEffect">
+                                  <p:stCondLst>
+                                    <p:cond delay="0"/>
+                                  </p:stCondLst>
+                                  <p:childTnLst>
+                                    <p:set>
+                                      <p:cBhvr>
+                                        <p:cTn id="14" dur="1" fill="hold">
+                                          <p:stCondLst>
+                                            <p:cond delay="0"/>
+                                          </p:stCondLst>
+                                        </p:cTn>
+                                        <p:tgtEl>
+                                          <p:spTgt spid="9"/>
+                                        </p:tgtEl>
+                                        <p:attrNameLst>
+                                          <p:attrName>style.visibility</p:attrName>
+                                        </p:attrNameLst>
+                                      </p:cBhvr>
+                                      <p:to>
+                                        <p:strVal val="visible"/>
+                                      </p:to>
+                                    </p:set>
+                                  </p:childTnLst>
+                                </p:cTn>
+                              </p:par>
+                            </p:childTnLst>
+                          </p:cTn>
+                        </p:par>
+                      </p:childTnLst>
+                    </p:cTn>
+                  </p:par>
+                </p:childTnLst>
+              </p:cTn>
+              <p:prevCondLst>
+                <p:cond evt="onPrev" delay="0">
+                  <p:tgtEl>
+                    <p:sldTgt/>
+                  </p:tgtEl>
+                </p:cond>
+              </p:prevCondLst>
+              <p:nextCondLst>
+                <p:cond evt="onNext" delay="0">
+                  <p:tgtEl>
+                    <p:sldTgt/>
+                  </p:tgtEl>
+                </p:cond>
+              </p:nextCondLst>
+            </p:seq>
+          </p:childTnLst>
+        </p:cTn>
+      </p:par>
+    </p:tnLst>
+    <p:bldLst>
+      <p:bldP spid="8" grpId="0"/>
+      <p:bldP spid="9" grpId="0"/>
+    </p:bldLst>
+  </p:timing>
 </p:sld>
 </file>
 
@@ -8584,6 +8729,129 @@
   <p:clrMapOvr>
     <a:masterClrMapping/>
   </p:clrMapOvr>
+  <p:timing>
+    <p:tnLst>
+      <p:par>
+        <p:cTn id="1" dur="indefinite" restart="never" nodeType="tmRoot">
+          <p:childTnLst>
+            <p:seq concurrent="1" nextAc="seek">
+              <p:cTn id="2" dur="indefinite" nodeType="mainSeq">
+                <p:childTnLst>
+                  <p:par>
+                    <p:cTn id="3" fill="hold">
+                      <p:stCondLst>
+                        <p:cond delay="indefinite"/>
+                      </p:stCondLst>
+                      <p:childTnLst>
+                        <p:par>
+                          <p:cTn id="4" fill="hold">
+                            <p:stCondLst>
+                              <p:cond delay="0"/>
+                            </p:stCondLst>
+                            <p:childTnLst>
+                              <p:par>
+                                <p:cTn id="5" presetID="1" presetClass="entr" presetSubtype="0" fill="hold" nodeType="clickEffect">
+                                  <p:stCondLst>
+                                    <p:cond delay="0"/>
+                                  </p:stCondLst>
+                                  <p:childTnLst>
+                                    <p:set>
+                                      <p:cBhvr>
+                                        <p:cTn id="6" dur="1" fill="hold">
+                                          <p:stCondLst>
+                                            <p:cond delay="0"/>
+                                          </p:stCondLst>
+                                        </p:cTn>
+                                        <p:tgtEl>
+                                          <p:spTgt spid="5"/>
+                                        </p:tgtEl>
+                                        <p:attrNameLst>
+                                          <p:attrName>style.visibility</p:attrName>
+                                        </p:attrNameLst>
+                                      </p:cBhvr>
+                                      <p:to>
+                                        <p:strVal val="visible"/>
+                                      </p:to>
+                                    </p:set>
+                                  </p:childTnLst>
+                                </p:cTn>
+                              </p:par>
+                            </p:childTnLst>
+                          </p:cTn>
+                        </p:par>
+                      </p:childTnLst>
+                    </p:cTn>
+                  </p:par>
+                  <p:par>
+                    <p:cTn id="7" fill="hold">
+                      <p:stCondLst>
+                        <p:cond delay="indefinite"/>
+                      </p:stCondLst>
+                      <p:childTnLst>
+                        <p:par>
+                          <p:cTn id="8" fill="hold">
+                            <p:stCondLst>
+                              <p:cond delay="0"/>
+                            </p:stCondLst>
+                            <p:childTnLst>
+                              <p:par>
+                                <p:cTn id="9" presetID="1" presetClass="entr" presetSubtype="0" fill="hold" grpId="0" nodeType="clickEffect">
+                                  <p:stCondLst>
+                                    <p:cond delay="0"/>
+                                  </p:stCondLst>
+                                  <p:childTnLst>
+                                    <p:set>
+                                      <p:cBhvr>
+                                        <p:cTn id="10" dur="1" fill="hold">
+                                          <p:stCondLst>
+                                            <p:cond delay="0"/>
+                                          </p:stCondLst>
+                                        </p:cTn>
+                                        <p:tgtEl>
+                                          <p:spTgt spid="7"/>
+                                        </p:tgtEl>
+                                        <p:attrNameLst>
+                                          <p:attrName>style.visibility</p:attrName>
+                                        </p:attrNameLst>
+                                      </p:cBhvr>
+                                      <p:to>
+                                        <p:strVal val="visible"/>
+                                      </p:to>
+                                    </p:set>
+                                  </p:childTnLst>
+                                </p:cTn>
+                              </p:par>
+                            </p:childTnLst>
+                          </p:cTn>
+                        </p:par>
+                      </p:childTnLst>
+                    </p:cTn>
+                  </p:par>
+                </p:childTnLst>
+              </p:cTn>
+              <p:prevCondLst>
+                <p:cond evt="onPrev" delay="0">
+                  <p:tgtEl>
+                    <p:sldTgt/>
+                  </p:tgtEl>
+                </p:cond>
+              </p:prevCondLst>
+              <p:nextCondLst>
+                <p:cond evt="onNext" delay="0">
+                  <p:tgtEl>
+                    <p:sldTgt/>
+                  </p:tgtEl>
+                </p:cond>
+              </p:nextCondLst>
+            </p:seq>
+          </p:childTnLst>
+        </p:cTn>
+      </p:par>
+    </p:tnLst>
+    <p:bldLst>
+      <p:bldP spid="7" grpId="0"/>
+    </p:bldLst>
+  </p:timing>
 </p:sld>
 </file>
 
@@ -9142,6 +9410,175 @@
   <p:clrMapOvr>
     <a:masterClrMapping/>
   </p:clrMapOvr>
+  <p:timing>
+    <p:tnLst>
+      <p:par>
+        <p:cTn id="1" dur="indefinite" restart="never" nodeType="tmRoot">
+          <p:childTnLst>
+            <p:seq concurrent="1" nextAc="seek">
+              <p:cTn id="2" dur="indefinite" nodeType="mainSeq">
+                <p:childTnLst>
+                  <p:par>
+                    <p:cTn id="3" fill="hold">
+                      <p:stCondLst>
+                        <p:cond delay="indefinite"/>
+                      </p:stCondLst>
+                      <p:childTnLst>
+                        <p:par>
+                          <p:cTn id="4" fill="hold">
+                            <p:stCondLst>
+                              <p:cond delay="0"/>
+                            </p:stCondLst>
+                            <p:childTnLst>
+                              <p:par>
+                                <p:cTn id="5" presetID="1" presetClass="entr" presetSubtype="0" fill="hold" grpId="0" nodeType="clickEffect">
+                                  <p:stCondLst>
+                                    <p:cond delay="0"/>
+                                  </p:stCondLst>
+                                  <p:childTnLst>
+                                    <p:set>
+                                      <p:cBhvr>
+                                        <p:cTn id="6" dur="1" fill="hold">
+                                          <p:stCondLst>
+                                            <p:cond delay="0"/>
+                                          </p:stCondLst>
+                                        </p:cTn>
+                                        <p:tgtEl>
+                                          <p:spTgt spid="6"/>
+                                        </p:tgtEl>
+                                        <p:attrNameLst>
+                                          <p:attrName>style.visibility</p:attrName>
+                                        </p:attrNameLst>
+                                      </p:cBhvr>
+                                      <p:to>
+                                        <p:strVal val="visible"/>
+                                      </p:to>
+                                    </p:set>
+                                  </p:childTnLst>
+                                </p:cTn>
+                              </p:par>
+                            </p:childTnLst>
+                          </p:cTn>
+                        </p:par>
+                      </p:childTnLst>
+                    </p:cTn>
+                  </p:par>
+                  <p:par>
+                    <p:cTn id="7" fill="hold">
+                      <p:stCondLst>
+                        <p:cond delay="indefinite"/>
+                      </p:stCondLst>
+                      <p:childTnLst>
+                        <p:par>
+                          <p:cTn id="8" fill="hold">
+                            <p:stCondLst>
+                              <p:cond delay="0"/>
+                            </p:stCondLst>
+                            <p:childTnLst>
+                              <p:par>
+                                <p:cTn id="9" presetID="1" presetClass="entr" presetSubtype="0" fill="hold" nodeType="clickEffect">
+                                  <p:stCondLst>
+                                    <p:cond delay="0"/>
+                                  </p:stCondLst>
+                                  <p:childTnLst>
+                                    <p:set>
+                                      <p:cBhvr>
+                                        <p:cTn id="10" dur="1" fill="hold">
+                                          <p:stCondLst>
+                                            <p:cond delay="0"/>
+                                          </p:stCondLst>
+                                        </p:cTn>
+                                        <p:tgtEl>
+                                          <p:spTgt spid="4"/>
+                                        </p:tgtEl>
+                                        <p:attrNameLst>
+                                          <p:attrName>style.visibility</p:attrName>
+                                        </p:attrNameLst>
+                                      </p:cBhvr>
+                                      <p:to>
+                                        <p:strVal val="visible"/>
+                                      </p:to>
+                                    </p:set>
+                                  </p:childTnLst>
+                                </p:cTn>
+                              </p:par>
+                            </p:childTnLst>
+                          </p:cTn>
+                        </p:par>
+                      </p:childTnLst>
+                    </p:cTn>
+                  </p:par>
+                  <p:par>
+                    <p:cTn id="11" fill="hold">
+                      <p:stCondLst>
+                        <p:cond delay="indefinite"/>
+                      </p:stCondLst>
+                      <p:childTnLst>
+                        <p:par>
+                          <p:cTn id="12" fill="hold">
+                            <p:stCondLst>
+                              <p:cond delay="0"/>
+                            </p:stCondLst>
+                            <p:childTnLst>
+                              <p:par>
+                                <p:cTn id="13" presetID="1" presetClass="entr" presetSubtype="0" fill="hold" grpId="0" nodeType="clickEffect">
+                                  <p:stCondLst>
+                                    <p:cond delay="0"/>
+                                  </p:stCondLst>
+                                  <p:childTnLst>
+                                    <p:set>
+                                      <p:cBhvr>
+                                        <p:cTn id="14" dur="1" fill="hold">
+                                          <p:stCondLst>
+                                            <p:cond delay="0"/>
+                                          </p:stCondLst>
+                                        </p:cTn>
+                                        <p:tgtEl>
+                                          <p:spTgt spid="7"/>
+                                        </p:tgtEl>
+                                        <p:attrNameLst>
+                                          <p:attrName>style.visibility</p:attrName>
+                                        </p:attrNameLst>
+                                      </p:cBhvr>
+                                      <p:to>
+                                        <p:strVal val="visible"/>
+                                      </p:to>
+                                    </p:set>
+                                  </p:childTnLst>
+                                </p:cTn>
+                              </p:par>
+                            </p:childTnLst>
+                          </p:cTn>
+                        </p:par>
+                      </p:childTnLst>
+                    </p:cTn>
+                  </p:par>
+                </p:childTnLst>
+              </p:cTn>
+              <p:prevCondLst>
+                <p:cond evt="onPrev" delay="0">
+                  <p:tgtEl>
+                    <p:sldTgt/>
+                  </p:tgtEl>
+                </p:cond>
+              </p:prevCondLst>
+              <p:nextCondLst>
+                <p:cond evt="onNext" delay="0">
+                  <p:tgtEl>
+                    <p:sldTgt/>
+                  </p:tgtEl>
+                </p:cond>
+              </p:nextCondLst>
+            </p:seq>
+          </p:childTnLst>
+        </p:cTn>
+      </p:par>
+    </p:tnLst>
+    <p:bldLst>
+      <p:bldP spid="6" grpId="0"/>
+      <p:bldP spid="7" grpId="0"/>
+    </p:bldLst>
+  </p:timing>
 </p:sld>
 </file>
 
@@ -9635,8 +10072,13 @@
               <a:rPr lang="en-US" dirty="0">
                 <a:latin typeface="HelveticaNeue" panose="00000400000000000000" pitchFamily="2" charset="0"/>
               </a:rPr>
-              <a:t>As an expression</a:t>
+              <a:t>As an expression (replaces the ? Operator)</a:t>
             </a:r>
+          </a:p>
+          <a:p>
+            <a:endParaRPr lang="en-US" dirty="0">
+              <a:latin typeface="HelveticaNeue" panose="00000400000000000000" pitchFamily="2" charset="0"/>
+            </a:endParaRPr>
           </a:p>
         </p:txBody>
       </p:sp>
@@ -9710,6 +10152,184 @@
   <p:clrMapOvr>
     <a:masterClrMapping/>
   </p:clrMapOvr>
+  <p:timing>
+    <p:tnLst>
+      <p:par>
+        <p:cTn id="1" dur="indefinite" restart="never" nodeType="tmRoot">
+          <p:childTnLst>
+            <p:seq concurrent="1" nextAc="seek">
+              <p:cTn id="2" dur="indefinite" nodeType="mainSeq">
+                <p:childTnLst>
+                  <p:par>
+                    <p:cTn id="3" fill="hold">
+                      <p:stCondLst>
+                        <p:cond delay="indefinite"/>
+                      </p:stCondLst>
+                      <p:childTnLst>
+                        <p:par>
+                          <p:cTn id="4" fill="hold">
+                            <p:stCondLst>
+                              <p:cond delay="0"/>
+                            </p:stCondLst>
+                            <p:childTnLst>
+                              <p:par>
+                                <p:cTn id="5" presetID="1" presetClass="entr" presetSubtype="0" fill="hold" grpId="0" nodeType="clickEffect">
+                                  <p:stCondLst>
+                                    <p:cond delay="0"/>
+                                  </p:stCondLst>
+                                  <p:childTnLst>
+                                    <p:set>
+                                      <p:cBhvr>
+                                        <p:cTn id="6" dur="1" fill="hold">
+                                          <p:stCondLst>
+                                            <p:cond delay="0"/>
+                                          </p:stCondLst>
+                                        </p:cTn>
+                                        <p:tgtEl>
+                                          <p:spTgt spid="6"/>
+                                        </p:tgtEl>
+                                        <p:attrNameLst>
+                                          <p:attrName>style.visibility</p:attrName>
+                                        </p:attrNameLst>
+                                      </p:cBhvr>
+                                      <p:to>
+                                        <p:strVal val="visible"/>
+                                      </p:to>
+                                    </p:set>
+                                  </p:childTnLst>
+                                </p:cTn>
+                              </p:par>
+                              <p:par>
+                                <p:cTn id="7" presetID="1" presetClass="entr" presetSubtype="0" fill="hold" nodeType="withEffect">
+                                  <p:stCondLst>
+                                    <p:cond delay="0"/>
+                                  </p:stCondLst>
+                                  <p:childTnLst>
+                                    <p:set>
+                                      <p:cBhvr>
+                                        <p:cTn id="8" dur="1" fill="hold">
+                                          <p:stCondLst>
+                                            <p:cond delay="0"/>
+                                          </p:stCondLst>
+                                        </p:cTn>
+                                        <p:tgtEl>
+                                          <p:spTgt spid="5"/>
+                                        </p:tgtEl>
+                                        <p:attrNameLst>
+                                          <p:attrName>style.visibility</p:attrName>
+                                        </p:attrNameLst>
+                                      </p:cBhvr>
+                                      <p:to>
+                                        <p:strVal val="visible"/>
+                                      </p:to>
+                                    </p:set>
+                                  </p:childTnLst>
+                                </p:cTn>
+                              </p:par>
+                            </p:childTnLst>
+                          </p:cTn>
+                        </p:par>
+                      </p:childTnLst>
+                    </p:cTn>
+                  </p:par>
+                  <p:par>
+                    <p:cTn id="9" fill="hold">
+                      <p:stCondLst>
+                        <p:cond delay="indefinite"/>
+                      </p:stCondLst>
+                      <p:childTnLst>
+                        <p:par>
+                          <p:cTn id="10" fill="hold">
+                            <p:stCondLst>
+                              <p:cond delay="0"/>
+                            </p:stCondLst>
+                            <p:childTnLst>
+                              <p:par>
+                                <p:cTn id="11" presetID="1" presetClass="entr" presetSubtype="0" fill="hold" grpId="0" nodeType="clickEffect">
+                                  <p:stCondLst>
+                                    <p:cond delay="0"/>
+                                  </p:stCondLst>
+                                  <p:childTnLst>
+                                    <p:set>
+                                      <p:cBhvr>
+                                        <p:cTn id="12" dur="1" fill="hold">
+                                          <p:stCondLst>
+                                            <p:cond delay="0"/>
+                                          </p:stCondLst>
+                                        </p:cTn>
+                                        <p:tgtEl>
+                                          <p:spTgt spid="7"/>
+                                        </p:tgtEl>
+                                        <p:attrNameLst>
+                                          <p:attrName>style.visibility</p:attrName>
+                                        </p:attrNameLst>
+                                      </p:cBhvr>
+                                      <p:to>
+                                        <p:strVal val="visible"/>
+                                      </p:to>
+                                    </p:set>
+                                  </p:childTnLst>
+                                </p:cTn>
+                              </p:par>
+                              <p:par>
+                                <p:cTn id="13" presetID="1" presetClass="entr" presetSubtype="0" fill="hold" nodeType="withEffect">
+                                  <p:stCondLst>
+                                    <p:cond delay="0"/>
+                                  </p:stCondLst>
+                                  <p:childTnLst>
+                                    <p:set>
+                                      <p:cBhvr>
+                                        <p:cTn id="14" dur="1" fill="hold">
+                                          <p:stCondLst>
+                                            <p:cond delay="0"/>
+                                          </p:stCondLst>
+                                        </p:cTn>
+                                        <p:tgtEl>
+                                          <p:spTgt spid="9"/>
+                                        </p:tgtEl>
+                                        <p:attrNameLst>
+                                          <p:attrName>style.visibility</p:attrName>
+                                        </p:attrNameLst>
+                                      </p:cBhvr>
+                                      <p:to>
+                                        <p:strVal val="visible"/>
+                                      </p:to>
+                                    </p:set>
+                                  </p:childTnLst>
+                                </p:cTn>
+                              </p:par>
+                            </p:childTnLst>
+                          </p:cTn>
+                        </p:par>
+                      </p:childTnLst>
+                    </p:cTn>
+                  </p:par>
+                </p:childTnLst>
+              </p:cTn>
+              <p:prevCondLst>
+                <p:cond evt="onPrev" delay="0">
+                  <p:tgtEl>
+                    <p:sldTgt/>
+                  </p:tgtEl>
+                </p:cond>
+              </p:prevCondLst>
+              <p:nextCondLst>
+                <p:cond evt="onNext" delay="0">
+                  <p:tgtEl>
+                    <p:sldTgt/>
+                  </p:tgtEl>
+                </p:cond>
+              </p:nextCondLst>
+            </p:seq>
+          </p:childTnLst>
+        </p:cTn>
+      </p:par>
+    </p:tnLst>
+    <p:bldLst>
+      <p:bldP spid="6" grpId="0"/>
+      <p:bldP spid="7" grpId="0"/>
+    </p:bldLst>
+  </p:timing>
 </p:sld>
 </file>
 
@@ -10050,6 +10670,111 @@
   <p:clrMapOvr>
     <a:masterClrMapping/>
   </p:clrMapOvr>
+  <p:timing>
+    <p:tnLst>
+      <p:par>
+        <p:cTn id="1" dur="indefinite" restart="never" nodeType="tmRoot">
+          <p:childTnLst>
+            <p:seq concurrent="1" nextAc="seek">
+              <p:cTn id="2" dur="indefinite" nodeType="mainSeq">
+                <p:childTnLst>
+                  <p:par>
+                    <p:cTn id="3" fill="hold">
+                      <p:stCondLst>
+                        <p:cond delay="indefinite"/>
+                      </p:stCondLst>
+                      <p:childTnLst>
+                        <p:par>
+                          <p:cTn id="4" fill="hold">
+                            <p:stCondLst>
+                              <p:cond delay="0"/>
+                            </p:stCondLst>
+                            <p:childTnLst>
+                              <p:par>
+                                <p:cTn id="5" presetID="1" presetClass="entr" presetSubtype="0" fill="hold" grpId="0" nodeType="clickEffect">
+                                  <p:stCondLst>
+                                    <p:cond delay="0"/>
+                                  </p:stCondLst>
+                                  <p:childTnLst>
+                                    <p:set>
+                                      <p:cBhvr>
+                                        <p:cTn id="6" dur="1" fill="hold">
+                                          <p:stCondLst>
+                                            <p:cond delay="0"/>
+                                          </p:stCondLst>
+                                        </p:cTn>
+                                        <p:tgtEl>
+                                          <p:spTgt spid="6"/>
+                                        </p:tgtEl>
+                                        <p:attrNameLst>
+                                          <p:attrName>style.visibility</p:attrName>
+                                        </p:attrNameLst>
+                                      </p:cBhvr>
+                                      <p:to>
+                                        <p:strVal val="visible"/>
+                                      </p:to>
+                                    </p:set>
+                                  </p:childTnLst>
+                                </p:cTn>
+                              </p:par>
+                              <p:par>
+                                <p:cTn id="7" presetID="1" presetClass="entr" presetSubtype="0" fill="hold" nodeType="withEffect">
+                                  <p:stCondLst>
+                                    <p:cond delay="0"/>
+                                  </p:stCondLst>
+                                  <p:childTnLst>
+                                    <p:set>
+                                      <p:cBhvr>
+                                        <p:cTn id="8" dur="1" fill="hold">
+                                          <p:stCondLst>
+                                            <p:cond delay="0"/>
+                                          </p:stCondLst>
+                                        </p:cTn>
+                                        <p:tgtEl>
+                                          <p:spTgt spid="10"/>
+                                        </p:tgtEl>
+                                        <p:attrNameLst>
+                                          <p:attrName>style.visibility</p:attrName>
+                                        </p:attrNameLst>
+                                      </p:cBhvr>
+                                      <p:to>
+                                        <p:strVal val="visible"/>
+                                      </p:to>
+                                    </p:set>
+                                  </p:childTnLst>
+                                </p:cTn>
+                              </p:par>
+                            </p:childTnLst>
+                          </p:cTn>
+                        </p:par>
+                      </p:childTnLst>
+                    </p:cTn>
+                  </p:par>
+                </p:childTnLst>
+              </p:cTn>
+              <p:prevCondLst>
+                <p:cond evt="onPrev" delay="0">
+                  <p:tgtEl>
+                    <p:sldTgt/>
+                  </p:tgtEl>
+                </p:cond>
+              </p:prevCondLst>
+              <p:nextCondLst>
+                <p:cond evt="onNext" delay="0">
+                  <p:tgtEl>
+                    <p:sldTgt/>
+                  </p:tgtEl>
+                </p:cond>
+              </p:nextCondLst>
+            </p:seq>
+          </p:childTnLst>
+        </p:cTn>
+      </p:par>
+    </p:tnLst>
+    <p:bldLst>
+      <p:bldP spid="6" grpId="0"/>
+    </p:bldLst>
+  </p:timing>
 </p:sld>
 </file>
 
@@ -11264,6 +11989,287 @@
   <p:clrMapOvr>
     <a:masterClrMapping/>
   </p:clrMapOvr>
+  <p:timing>
+    <p:tnLst>
+      <p:par>
+        <p:cTn id="1" dur="indefinite" restart="never" nodeType="tmRoot">
+          <p:childTnLst>
+            <p:seq concurrent="1" nextAc="seek">
+              <p:cTn id="2" dur="indefinite" nodeType="mainSeq">
+                <p:childTnLst>
+                  <p:par>
+                    <p:cTn id="3" fill="hold">
+                      <p:stCondLst>
+                        <p:cond delay="indefinite"/>
+                        <p:cond evt="onBegin" delay="0">
+                          <p:tn val="2"/>
+                        </p:cond>
+                      </p:stCondLst>
+                      <p:childTnLst>
+                        <p:par>
+                          <p:cTn id="4" fill="hold">
+                            <p:stCondLst>
+                              <p:cond delay="0"/>
+                            </p:stCondLst>
+                            <p:childTnLst>
+                              <p:par>
+                                <p:cTn id="5" presetID="1" presetClass="entr" presetSubtype="0" fill="hold" grpId="0" nodeType="withEffect">
+                                  <p:stCondLst>
+                                    <p:cond delay="0"/>
+                                  </p:stCondLst>
+                                  <p:childTnLst>
+                                    <p:set>
+                                      <p:cBhvr>
+                                        <p:cTn id="6" dur="1" fill="hold">
+                                          <p:stCondLst>
+                                            <p:cond delay="0"/>
+                                          </p:stCondLst>
+                                        </p:cTn>
+                                        <p:tgtEl>
+                                          <p:spTgt spid="3">
+                                            <p:txEl>
+                                              <p:pRg st="0" end="0"/>
+                                            </p:txEl>
+                                          </p:spTgt>
+                                        </p:tgtEl>
+                                        <p:attrNameLst>
+                                          <p:attrName>style.visibility</p:attrName>
+                                        </p:attrNameLst>
+                                      </p:cBhvr>
+                                      <p:to>
+                                        <p:strVal val="visible"/>
+                                      </p:to>
+                                    </p:set>
+                                  </p:childTnLst>
+                                </p:cTn>
+                              </p:par>
+                            </p:childTnLst>
+                          </p:cTn>
+                        </p:par>
+                      </p:childTnLst>
+                    </p:cTn>
+                  </p:par>
+                  <p:par>
+                    <p:cTn id="7" fill="hold">
+                      <p:stCondLst>
+                        <p:cond delay="indefinite"/>
+                      </p:stCondLst>
+                      <p:childTnLst>
+                        <p:par>
+                          <p:cTn id="8" fill="hold">
+                            <p:stCondLst>
+                              <p:cond delay="0"/>
+                            </p:stCondLst>
+                            <p:childTnLst>
+                              <p:par>
+                                <p:cTn id="9" presetID="1" presetClass="entr" presetSubtype="0" fill="hold" grpId="0" nodeType="clickEffect">
+                                  <p:stCondLst>
+                                    <p:cond delay="0"/>
+                                  </p:stCondLst>
+                                  <p:childTnLst>
+                                    <p:set>
+                                      <p:cBhvr>
+                                        <p:cTn id="10" dur="1" fill="hold">
+                                          <p:stCondLst>
+                                            <p:cond delay="0"/>
+                                          </p:stCondLst>
+                                        </p:cTn>
+                                        <p:tgtEl>
+                                          <p:spTgt spid="3">
+                                            <p:txEl>
+                                              <p:pRg st="2" end="2"/>
+                                            </p:txEl>
+                                          </p:spTgt>
+                                        </p:tgtEl>
+                                        <p:attrNameLst>
+                                          <p:attrName>style.visibility</p:attrName>
+                                        </p:attrNameLst>
+                                      </p:cBhvr>
+                                      <p:to>
+                                        <p:strVal val="visible"/>
+                                      </p:to>
+                                    </p:set>
+                                  </p:childTnLst>
+                                </p:cTn>
+                              </p:par>
+                            </p:childTnLst>
+                          </p:cTn>
+                        </p:par>
+                      </p:childTnLst>
+                    </p:cTn>
+                  </p:par>
+                  <p:par>
+                    <p:cTn id="11" fill="hold">
+                      <p:stCondLst>
+                        <p:cond delay="indefinite"/>
+                      </p:stCondLst>
+                      <p:childTnLst>
+                        <p:par>
+                          <p:cTn id="12" fill="hold">
+                            <p:stCondLst>
+                              <p:cond delay="0"/>
+                            </p:stCondLst>
+                            <p:childTnLst>
+                              <p:par>
+                                <p:cTn id="13" presetID="1" presetClass="entr" presetSubtype="0" fill="hold" grpId="0" nodeType="clickEffect">
+                                  <p:stCondLst>
+                                    <p:cond delay="0"/>
+                                  </p:stCondLst>
+                                  <p:childTnLst>
+                                    <p:set>
+                                      <p:cBhvr>
+                                        <p:cTn id="14" dur="1" fill="hold">
+                                          <p:stCondLst>
+                                            <p:cond delay="0"/>
+                                          </p:stCondLst>
+                                        </p:cTn>
+                                        <p:tgtEl>
+                                          <p:spTgt spid="3">
+                                            <p:txEl>
+                                              <p:pRg st="4" end="4"/>
+                                            </p:txEl>
+                                          </p:spTgt>
+                                        </p:tgtEl>
+                                        <p:attrNameLst>
+                                          <p:attrName>style.visibility</p:attrName>
+                                        </p:attrNameLst>
+                                      </p:cBhvr>
+                                      <p:to>
+                                        <p:strVal val="visible"/>
+                                      </p:to>
+                                    </p:set>
+                                  </p:childTnLst>
+                                </p:cTn>
+                              </p:par>
+                            </p:childTnLst>
+                          </p:cTn>
+                        </p:par>
+                      </p:childTnLst>
+                    </p:cTn>
+                  </p:par>
+                  <p:par>
+                    <p:cTn id="15" fill="hold">
+                      <p:stCondLst>
+                        <p:cond delay="indefinite"/>
+                      </p:stCondLst>
+                      <p:childTnLst>
+                        <p:par>
+                          <p:cTn id="16" fill="hold">
+                            <p:stCondLst>
+                              <p:cond delay="0"/>
+                            </p:stCondLst>
+                            <p:childTnLst>
+                              <p:par>
+                                <p:cTn id="17" presetID="1" presetClass="entr" presetSubtype="0" fill="hold" grpId="0" nodeType="clickEffect">
+                                  <p:stCondLst>
+                                    <p:cond delay="0"/>
+                                  </p:stCondLst>
+                                  <p:childTnLst>
+                                    <p:set>
+                                      <p:cBhvr>
+                                        <p:cTn id="18" dur="1" fill="hold">
+                                          <p:stCondLst>
+                                            <p:cond delay="0"/>
+                                          </p:stCondLst>
+                                        </p:cTn>
+                                        <p:tgtEl>
+                                          <p:spTgt spid="3">
+                                            <p:txEl>
+                                              <p:pRg st="6" end="6"/>
+                                            </p:txEl>
+                                          </p:spTgt>
+                                        </p:tgtEl>
+                                        <p:attrNameLst>
+                                          <p:attrName>style.visibility</p:attrName>
+                                        </p:attrNameLst>
+                                      </p:cBhvr>
+                                      <p:to>
+                                        <p:strVal val="visible"/>
+                                      </p:to>
+                                    </p:set>
+                                  </p:childTnLst>
+                                </p:cTn>
+                              </p:par>
+                            </p:childTnLst>
+                          </p:cTn>
+                        </p:par>
+                      </p:childTnLst>
+                    </p:cTn>
+                  </p:par>
+                  <p:par>
+                    <p:cTn id="19" fill="hold">
+                      <p:stCondLst>
+                        <p:cond delay="indefinite"/>
+                      </p:stCondLst>
+                      <p:childTnLst>
+                        <p:par>
+                          <p:cTn id="20" fill="hold">
+                            <p:stCondLst>
+                              <p:cond delay="0"/>
+                            </p:stCondLst>
+                            <p:childTnLst>
+                              <p:par>
+                                <p:cTn id="21" presetID="1" presetClass="entr" presetSubtype="0" fill="hold" grpId="0" nodeType="clickEffect">
+                                  <p:stCondLst>
+                                    <p:cond delay="0"/>
+                                  </p:stCondLst>
+                                  <p:childTnLst>
+                                    <p:set>
+                                      <p:cBhvr>
+                                        <p:cTn id="22" dur="1" fill="hold">
+                                          <p:stCondLst>
+                                            <p:cond delay="0"/>
+                                          </p:stCondLst>
+                                        </p:cTn>
+                                        <p:tgtEl>
+                                          <p:spTgt spid="3">
+                                            <p:txEl>
+                                              <p:pRg st="8" end="8"/>
+                                            </p:txEl>
+                                          </p:spTgt>
+                                        </p:tgtEl>
+                                        <p:attrNameLst>
+                                          <p:attrName>style.visibility</p:attrName>
+                                        </p:attrNameLst>
+                                      </p:cBhvr>
+                                      <p:to>
+                                        <p:strVal val="visible"/>
+                                      </p:to>
+                                    </p:set>
+                                  </p:childTnLst>
+                                </p:cTn>
+                              </p:par>
+                            </p:childTnLst>
+                          </p:cTn>
+                        </p:par>
+                      </p:childTnLst>
+                    </p:cTn>
+                  </p:par>
+                </p:childTnLst>
+              </p:cTn>
+              <p:prevCondLst>
+                <p:cond evt="onPrev" delay="0">
+                  <p:tgtEl>
+                    <p:sldTgt/>
+                  </p:tgtEl>
+                </p:cond>
+              </p:prevCondLst>
+              <p:nextCondLst>
+                <p:cond evt="onNext" delay="0">
+                  <p:tgtEl>
+                    <p:sldTgt/>
+                  </p:tgtEl>
+                </p:cond>
+              </p:nextCondLst>
+            </p:seq>
+          </p:childTnLst>
+        </p:cTn>
+      </p:par>
+    </p:tnLst>
+    <p:bldLst>
+      <p:bldP spid="3" grpId="0" uiExpand="1" build="p"/>
+    </p:bldLst>
+  </p:timing>
 </p:sld>
 </file>
 
@@ -13960,6 +14966,186 @@
   <p:clrMapOvr>
     <a:masterClrMapping/>
   </p:clrMapOvr>
+  <p:timing>
+    <p:tnLst>
+      <p:par>
+        <p:cTn id="1" dur="indefinite" restart="never" nodeType="tmRoot">
+          <p:childTnLst>
+            <p:seq concurrent="1" nextAc="seek">
+              <p:cTn id="2" dur="indefinite" nodeType="mainSeq">
+                <p:childTnLst>
+                  <p:par>
+                    <p:cTn id="3" fill="hold">
+                      <p:stCondLst>
+                        <p:cond delay="indefinite"/>
+                      </p:stCondLst>
+                      <p:childTnLst>
+                        <p:par>
+                          <p:cTn id="4" fill="hold">
+                            <p:stCondLst>
+                              <p:cond delay="0"/>
+                            </p:stCondLst>
+                            <p:childTnLst>
+                              <p:par>
+                                <p:cTn id="5" presetID="1" presetClass="entr" presetSubtype="0" fill="hold" grpId="0" nodeType="clickEffect">
+                                  <p:stCondLst>
+                                    <p:cond delay="0"/>
+                                  </p:stCondLst>
+                                  <p:childTnLst>
+                                    <p:set>
+                                      <p:cBhvr>
+                                        <p:cTn id="6" dur="1" fill="hold">
+                                          <p:stCondLst>
+                                            <p:cond delay="0"/>
+                                          </p:stCondLst>
+                                        </p:cTn>
+                                        <p:tgtEl>
+                                          <p:spTgt spid="3">
+                                            <p:txEl>
+                                              <p:pRg st="2" end="2"/>
+                                            </p:txEl>
+                                          </p:spTgt>
+                                        </p:tgtEl>
+                                        <p:attrNameLst>
+                                          <p:attrName>style.visibility</p:attrName>
+                                        </p:attrNameLst>
+                                      </p:cBhvr>
+                                      <p:to>
+                                        <p:strVal val="visible"/>
+                                      </p:to>
+                                    </p:set>
+                                  </p:childTnLst>
+                                </p:cTn>
+                              </p:par>
+                            </p:childTnLst>
+                          </p:cTn>
+                        </p:par>
+                      </p:childTnLst>
+                    </p:cTn>
+                  </p:par>
+                  <p:par>
+                    <p:cTn id="7" fill="hold">
+                      <p:stCondLst>
+                        <p:cond delay="indefinite"/>
+                      </p:stCondLst>
+                      <p:childTnLst>
+                        <p:par>
+                          <p:cTn id="8" fill="hold">
+                            <p:stCondLst>
+                              <p:cond delay="0"/>
+                            </p:stCondLst>
+                            <p:childTnLst>
+                              <p:par>
+                                <p:cTn id="9" presetID="1" presetClass="entr" presetSubtype="0" fill="hold" grpId="0" nodeType="clickEffect">
+                                  <p:stCondLst>
+                                    <p:cond delay="0"/>
+                                  </p:stCondLst>
+                                  <p:childTnLst>
+                                    <p:set>
+                                      <p:cBhvr>
+                                        <p:cTn id="10" dur="1" fill="hold">
+                                          <p:stCondLst>
+                                            <p:cond delay="0"/>
+                                          </p:stCondLst>
+                                        </p:cTn>
+                                        <p:tgtEl>
+                                          <p:spTgt spid="3">
+                                            <p:txEl>
+                                              <p:pRg st="4" end="4"/>
+                                            </p:txEl>
+                                          </p:spTgt>
+                                        </p:tgtEl>
+                                        <p:attrNameLst>
+                                          <p:attrName>style.visibility</p:attrName>
+                                        </p:attrNameLst>
+                                      </p:cBhvr>
+                                      <p:to>
+                                        <p:strVal val="visible"/>
+                                      </p:to>
+                                    </p:set>
+                                  </p:childTnLst>
+                                </p:cTn>
+                              </p:par>
+                            </p:childTnLst>
+                          </p:cTn>
+                        </p:par>
+                      </p:childTnLst>
+                    </p:cTn>
+                  </p:par>
+                  <p:par>
+                    <p:cTn id="11" fill="hold">
+                      <p:stCondLst>
+                        <p:cond delay="indefinite"/>
+                      </p:stCondLst>
+                      <p:childTnLst>
+                        <p:par>
+                          <p:cTn id="12" fill="hold">
+                            <p:stCondLst>
+                              <p:cond delay="0"/>
+                            </p:stCondLst>
+                            <p:childTnLst>
+                              <p:par>
+                                <p:cTn id="13" presetID="1" presetClass="entr" presetSubtype="0" fill="hold" grpId="0" nodeType="clickEffect">
+                                  <p:stCondLst>
+                                    <p:cond delay="0"/>
+                                  </p:stCondLst>
+                                  <p:childTnLst>
+                                    <p:set>
+                                      <p:cBhvr>
+                                        <p:cTn id="14" dur="1" fill="hold">
+                                          <p:stCondLst>
+                                            <p:cond delay="0"/>
+                                          </p:stCondLst>
+                                        </p:cTn>
+                                        <p:tgtEl>
+                                          <p:spTgt spid="3">
+                                            <p:txEl>
+                                              <p:pRg st="6" end="6"/>
+                                            </p:txEl>
+                                          </p:spTgt>
+                                        </p:tgtEl>
+                                        <p:attrNameLst>
+                                          <p:attrName>style.visibility</p:attrName>
+                                        </p:attrNameLst>
+                                      </p:cBhvr>
+                                      <p:to>
+                                        <p:strVal val="visible"/>
+                                      </p:to>
+                                    </p:set>
+                                  </p:childTnLst>
+                                </p:cTn>
+                              </p:par>
+                            </p:childTnLst>
+                          </p:cTn>
+                        </p:par>
+                      </p:childTnLst>
+                    </p:cTn>
+                  </p:par>
+                </p:childTnLst>
+              </p:cTn>
+              <p:prevCondLst>
+                <p:cond evt="onPrev" delay="0">
+                  <p:tgtEl>
+                    <p:sldTgt/>
+                  </p:tgtEl>
+                </p:cond>
+              </p:prevCondLst>
+              <p:nextCondLst>
+                <p:cond evt="onNext" delay="0">
+                  <p:tgtEl>
+                    <p:sldTgt/>
+                  </p:tgtEl>
+                </p:cond>
+              </p:nextCondLst>
+            </p:seq>
+          </p:childTnLst>
+        </p:cTn>
+      </p:par>
+    </p:tnLst>
+    <p:bldLst>
+      <p:bldP spid="3" grpId="0" build="p"/>
+    </p:bldLst>
+  </p:timing>
 </p:sld>
 </file>
 
@@ -15047,6 +16233,180 @@
   <p:clrMapOvr>
     <a:masterClrMapping/>
   </p:clrMapOvr>
+  <p:timing>
+    <p:tnLst>
+      <p:par>
+        <p:cTn id="1" dur="indefinite" restart="never" nodeType="tmRoot">
+          <p:childTnLst>
+            <p:seq concurrent="1" nextAc="seek">
+              <p:cTn id="2" dur="indefinite" nodeType="mainSeq">
+                <p:childTnLst>
+                  <p:par>
+                    <p:cTn id="3" fill="hold">
+                      <p:stCondLst>
+                        <p:cond delay="indefinite"/>
+                      </p:stCondLst>
+                      <p:childTnLst>
+                        <p:par>
+                          <p:cTn id="4" fill="hold">
+                            <p:stCondLst>
+                              <p:cond delay="0"/>
+                            </p:stCondLst>
+                            <p:childTnLst>
+                              <p:par>
+                                <p:cTn id="5" presetID="1" presetClass="entr" presetSubtype="0" fill="hold" nodeType="clickEffect">
+                                  <p:stCondLst>
+                                    <p:cond delay="0"/>
+                                  </p:stCondLst>
+                                  <p:childTnLst>
+                                    <p:set>
+                                      <p:cBhvr>
+                                        <p:cTn id="6" dur="1" fill="hold">
+                                          <p:stCondLst>
+                                            <p:cond delay="0"/>
+                                          </p:stCondLst>
+                                        </p:cTn>
+                                        <p:tgtEl>
+                                          <p:spTgt spid="5"/>
+                                        </p:tgtEl>
+                                        <p:attrNameLst>
+                                          <p:attrName>style.visibility</p:attrName>
+                                        </p:attrNameLst>
+                                      </p:cBhvr>
+                                      <p:to>
+                                        <p:strVal val="visible"/>
+                                      </p:to>
+                                    </p:set>
+                                  </p:childTnLst>
+                                </p:cTn>
+                              </p:par>
+                              <p:par>
+                                <p:cTn id="7" presetID="1" presetClass="entr" presetSubtype="0" fill="hold" nodeType="withEffect">
+                                  <p:stCondLst>
+                                    <p:cond delay="0"/>
+                                  </p:stCondLst>
+                                  <p:childTnLst>
+                                    <p:set>
+                                      <p:cBhvr>
+                                        <p:cTn id="8" dur="1" fill="hold">
+                                          <p:stCondLst>
+                                            <p:cond delay="0"/>
+                                          </p:stCondLst>
+                                        </p:cTn>
+                                        <p:tgtEl>
+                                          <p:spTgt spid="6"/>
+                                        </p:tgtEl>
+                                        <p:attrNameLst>
+                                          <p:attrName>style.visibility</p:attrName>
+                                        </p:attrNameLst>
+                                      </p:cBhvr>
+                                      <p:to>
+                                        <p:strVal val="visible"/>
+                                      </p:to>
+                                    </p:set>
+                                  </p:childTnLst>
+                                </p:cTn>
+                              </p:par>
+                            </p:childTnLst>
+                          </p:cTn>
+                        </p:par>
+                      </p:childTnLst>
+                    </p:cTn>
+                  </p:par>
+                  <p:par>
+                    <p:cTn id="9" fill="hold">
+                      <p:stCondLst>
+                        <p:cond delay="indefinite"/>
+                      </p:stCondLst>
+                      <p:childTnLst>
+                        <p:par>
+                          <p:cTn id="10" fill="hold">
+                            <p:stCondLst>
+                              <p:cond delay="0"/>
+                            </p:stCondLst>
+                            <p:childTnLst>
+                              <p:par>
+                                <p:cTn id="11" presetID="1" presetClass="entr" presetSubtype="0" fill="hold" nodeType="clickEffect">
+                                  <p:stCondLst>
+                                    <p:cond delay="0"/>
+                                  </p:stCondLst>
+                                  <p:childTnLst>
+                                    <p:set>
+                                      <p:cBhvr>
+                                        <p:cTn id="12" dur="1" fill="hold">
+                                          <p:stCondLst>
+                                            <p:cond delay="0"/>
+                                          </p:stCondLst>
+                                        </p:cTn>
+                                        <p:tgtEl>
+                                          <p:spTgt spid="9"/>
+                                        </p:tgtEl>
+                                        <p:attrNameLst>
+                                          <p:attrName>style.visibility</p:attrName>
+                                        </p:attrNameLst>
+                                      </p:cBhvr>
+                                      <p:to>
+                                        <p:strVal val="visible"/>
+                                      </p:to>
+                                    </p:set>
+                                  </p:childTnLst>
+                                </p:cTn>
+                              </p:par>
+                              <p:par>
+                                <p:cTn id="13" presetID="1" presetClass="entr" presetSubtype="0" fill="hold" nodeType="withEffect">
+                                  <p:stCondLst>
+                                    <p:cond delay="0"/>
+                                  </p:stCondLst>
+                                  <p:childTnLst>
+                                    <p:set>
+                                      <p:cBhvr>
+                                        <p:cTn id="14" dur="1" fill="hold">
+                                          <p:stCondLst>
+                                            <p:cond delay="0"/>
+                                          </p:stCondLst>
+                                        </p:cTn>
+                                        <p:tgtEl>
+                                          <p:spTgt spid="10"/>
+                                        </p:tgtEl>
+                                        <p:attrNameLst>
+                                          <p:attrName>style.visibility</p:attrName>
+                                        </p:attrNameLst>
+                                      </p:cBhvr>
+                                      <p:to>
+                                        <p:strVal val="visible"/>
+                                      </p:to>
+                                    </p:set>
+                                  </p:childTnLst>
+                                </p:cTn>
+                              </p:par>
+                            </p:childTnLst>
+                          </p:cTn>
+                        </p:par>
+                      </p:childTnLst>
+                    </p:cTn>
+                  </p:par>
+                </p:childTnLst>
+              </p:cTn>
+              <p:prevCondLst>
+                <p:cond evt="onPrev" delay="0">
+                  <p:tgtEl>
+                    <p:sldTgt/>
+                  </p:tgtEl>
+                </p:cond>
+              </p:prevCondLst>
+              <p:nextCondLst>
+                <p:cond evt="onNext" delay="0">
+                  <p:tgtEl>
+                    <p:sldTgt/>
+                  </p:tgtEl>
+                </p:cond>
+              </p:nextCondLst>
+            </p:seq>
+          </p:childTnLst>
+        </p:cTn>
+      </p:par>
+    </p:tnLst>
+  </p:timing>
 </p:sld>
 </file>
 
@@ -15835,6 +17195,238 @@
   <p:clrMapOvr>
     <a:masterClrMapping/>
   </p:clrMapOvr>
+  <p:timing>
+    <p:tnLst>
+      <p:par>
+        <p:cTn id="1" dur="indefinite" restart="never" nodeType="tmRoot">
+          <p:childTnLst>
+            <p:seq concurrent="1" nextAc="seek">
+              <p:cTn id="2" dur="indefinite" nodeType="mainSeq">
+                <p:childTnLst>
+                  <p:par>
+                    <p:cTn id="3" fill="hold">
+                      <p:stCondLst>
+                        <p:cond delay="indefinite"/>
+                      </p:stCondLst>
+                      <p:childTnLst>
+                        <p:par>
+                          <p:cTn id="4" fill="hold">
+                            <p:stCondLst>
+                              <p:cond delay="0"/>
+                            </p:stCondLst>
+                            <p:childTnLst>
+                              <p:par>
+                                <p:cTn id="5" presetID="1" presetClass="entr" presetSubtype="0" fill="hold" nodeType="clickEffect">
+                                  <p:stCondLst>
+                                    <p:cond delay="0"/>
+                                  </p:stCondLst>
+                                  <p:childTnLst>
+                                    <p:set>
+                                      <p:cBhvr>
+                                        <p:cTn id="6" dur="1" fill="hold">
+                                          <p:stCondLst>
+                                            <p:cond delay="0"/>
+                                          </p:stCondLst>
+                                        </p:cTn>
+                                        <p:tgtEl>
+                                          <p:spTgt spid="4"/>
+                                        </p:tgtEl>
+                                        <p:attrNameLst>
+                                          <p:attrName>style.visibility</p:attrName>
+                                        </p:attrNameLst>
+                                      </p:cBhvr>
+                                      <p:to>
+                                        <p:strVal val="visible"/>
+                                      </p:to>
+                                    </p:set>
+                                  </p:childTnLst>
+                                </p:cTn>
+                              </p:par>
+                              <p:par>
+                                <p:cTn id="7" presetID="1" presetClass="entr" presetSubtype="0" fill="hold" grpId="0" nodeType="withEffect">
+                                  <p:stCondLst>
+                                    <p:cond delay="0"/>
+                                  </p:stCondLst>
+                                  <p:childTnLst>
+                                    <p:set>
+                                      <p:cBhvr>
+                                        <p:cTn id="8" dur="1" fill="hold">
+                                          <p:stCondLst>
+                                            <p:cond delay="0"/>
+                                          </p:stCondLst>
+                                        </p:cTn>
+                                        <p:tgtEl>
+                                          <p:spTgt spid="6"/>
+                                        </p:tgtEl>
+                                        <p:attrNameLst>
+                                          <p:attrName>style.visibility</p:attrName>
+                                        </p:attrNameLst>
+                                      </p:cBhvr>
+                                      <p:to>
+                                        <p:strVal val="visible"/>
+                                      </p:to>
+                                    </p:set>
+                                  </p:childTnLst>
+                                </p:cTn>
+                              </p:par>
+                            </p:childTnLst>
+                          </p:cTn>
+                        </p:par>
+                      </p:childTnLst>
+                    </p:cTn>
+                  </p:par>
+                  <p:par>
+                    <p:cTn id="9" fill="hold">
+                      <p:stCondLst>
+                        <p:cond delay="indefinite"/>
+                      </p:stCondLst>
+                      <p:childTnLst>
+                        <p:par>
+                          <p:cTn id="10" fill="hold">
+                            <p:stCondLst>
+                              <p:cond delay="0"/>
+                            </p:stCondLst>
+                            <p:childTnLst>
+                              <p:par>
+                                <p:cTn id="11" presetID="1" presetClass="entr" presetSubtype="0" fill="hold" nodeType="clickEffect">
+                                  <p:stCondLst>
+                                    <p:cond delay="0"/>
+                                  </p:stCondLst>
+                                  <p:childTnLst>
+                                    <p:set>
+                                      <p:cBhvr>
+                                        <p:cTn id="12" dur="1" fill="hold">
+                                          <p:stCondLst>
+                                            <p:cond delay="0"/>
+                                          </p:stCondLst>
+                                        </p:cTn>
+                                        <p:tgtEl>
+                                          <p:spTgt spid="5"/>
+                                        </p:tgtEl>
+                                        <p:attrNameLst>
+                                          <p:attrName>style.visibility</p:attrName>
+                                        </p:attrNameLst>
+                                      </p:cBhvr>
+                                      <p:to>
+                                        <p:strVal val="visible"/>
+                                      </p:to>
+                                    </p:set>
+                                  </p:childTnLst>
+                                </p:cTn>
+                              </p:par>
+                              <p:par>
+                                <p:cTn id="13" presetID="1" presetClass="entr" presetSubtype="0" fill="hold" nodeType="withEffect">
+                                  <p:stCondLst>
+                                    <p:cond delay="0"/>
+                                  </p:stCondLst>
+                                  <p:childTnLst>
+                                    <p:set>
+                                      <p:cBhvr>
+                                        <p:cTn id="14" dur="1" fill="hold">
+                                          <p:stCondLst>
+                                            <p:cond delay="0"/>
+                                          </p:stCondLst>
+                                        </p:cTn>
+                                        <p:tgtEl>
+                                          <p:spTgt spid="8"/>
+                                        </p:tgtEl>
+                                        <p:attrNameLst>
+                                          <p:attrName>style.visibility</p:attrName>
+                                        </p:attrNameLst>
+                                      </p:cBhvr>
+                                      <p:to>
+                                        <p:strVal val="visible"/>
+                                      </p:to>
+                                    </p:set>
+                                  </p:childTnLst>
+                                </p:cTn>
+                              </p:par>
+                              <p:par>
+                                <p:cTn id="15" presetID="1" presetClass="entr" presetSubtype="0" fill="hold" grpId="0" nodeType="withEffect">
+                                  <p:stCondLst>
+                                    <p:cond delay="0"/>
+                                  </p:stCondLst>
+                                  <p:childTnLst>
+                                    <p:set>
+                                      <p:cBhvr>
+                                        <p:cTn id="16" dur="1" fill="hold">
+                                          <p:stCondLst>
+                                            <p:cond delay="0"/>
+                                          </p:stCondLst>
+                                        </p:cTn>
+                                        <p:tgtEl>
+                                          <p:spTgt spid="10"/>
+                                        </p:tgtEl>
+                                        <p:attrNameLst>
+                                          <p:attrName>style.visibility</p:attrName>
+                                        </p:attrNameLst>
+                                      </p:cBhvr>
+                                      <p:to>
+                                        <p:strVal val="visible"/>
+                                      </p:to>
+                                    </p:set>
+                                  </p:childTnLst>
+                                </p:cTn>
+                              </p:par>
+                              <p:par>
+                                <p:cTn id="17" presetID="1" presetClass="entr" presetSubtype="0" fill="hold" nodeType="withEffect">
+                                  <p:stCondLst>
+                                    <p:cond delay="0"/>
+                                  </p:stCondLst>
+                                  <p:childTnLst>
+                                    <p:set>
+                                      <p:cBhvr>
+                                        <p:cTn id="18" dur="1" fill="hold">
+                                          <p:stCondLst>
+                                            <p:cond delay="0"/>
+                                          </p:stCondLst>
+                                        </p:cTn>
+                                        <p:tgtEl>
+                                          <p:spTgt spid="9"/>
+                                        </p:tgtEl>
+                                        <p:attrNameLst>
+                                          <p:attrName>style.visibility</p:attrName>
+                                        </p:attrNameLst>
+                                      </p:cBhvr>
+                                      <p:to>
+                                        <p:strVal val="visible"/>
+                                      </p:to>
+                                    </p:set>
+                                  </p:childTnLst>
+                                </p:cTn>
+                              </p:par>
+                            </p:childTnLst>
+                          </p:cTn>
+                        </p:par>
+                      </p:childTnLst>
+                    </p:cTn>
+                  </p:par>
+                </p:childTnLst>
+              </p:cTn>
+              <p:prevCondLst>
+                <p:cond evt="onPrev" delay="0">
+                  <p:tgtEl>
+                    <p:sldTgt/>
+                  </p:tgtEl>
+                </p:cond>
+              </p:prevCondLst>
+              <p:nextCondLst>
+                <p:cond evt="onNext" delay="0">
+                  <p:tgtEl>
+                    <p:sldTgt/>
+                  </p:tgtEl>
+                </p:cond>
+              </p:nextCondLst>
+            </p:seq>
+          </p:childTnLst>
+        </p:cTn>
+      </p:par>
+    </p:tnLst>
+    <p:bldLst>
+      <p:bldP spid="6" grpId="0"/>
+      <p:bldP spid="10" grpId="0"/>
+    </p:bldLst>
+  </p:timing>
 </p:sld>
 </file>
 
@@ -16546,7 +18138,7 @@
           <p:cNvPr id="2" name="Title 1">
             <a:extLst>
               <a:ext uri="{FF2B5EF4-FFF2-40B4-BE49-F238E27FC236}">
-                <a16:creationId xmlns:a16="http://schemas.microsoft.com/office/drawing/2014/main" id="{E9EF106F-3006-463E-981D-FF081DD4BEC3}"/>
+                <a16:creationId xmlns:a16="http://schemas.microsoft.com/office/drawing/2014/main" id="{864327D8-51CC-40C2-BC44-BCD1D214434A}"/>
               </a:ext>
             </a:extLst>
           </p:cNvPr>
@@ -16559,9 +18151,7 @@
         </p:nvSpPr>
         <p:spPr/>
         <p:txBody>
-          <a:bodyPr>
-            <a:normAutofit/>
-          </a:bodyPr>
+          <a:bodyPr/>
           <a:lstStyle/>
           <a:p>
             <a:pPr algn="ctr"/>
@@ -16572,21 +18162,419 @@
                 </a:solidFill>
                 <a:latin typeface="HelveticaNeue" panose="00000400000000000000" pitchFamily="2" charset="0"/>
               </a:rPr>
-              <a:t>The Basics</a:t>
+              <a:t>Quick Word About Expression</a:t>
             </a:r>
+          </a:p>
+        </p:txBody>
+      </p:sp>
+      <p:sp>
+        <p:nvSpPr>
+          <p:cNvPr id="3" name="Content Placeholder 2">
+            <a:extLst>
+              <a:ext uri="{FF2B5EF4-FFF2-40B4-BE49-F238E27FC236}">
+                <a16:creationId xmlns:a16="http://schemas.microsoft.com/office/drawing/2014/main" id="{0B4BEB8C-B864-4828-9764-C4CDAC884183}"/>
+              </a:ext>
+            </a:extLst>
+          </p:cNvPr>
+          <p:cNvSpPr>
+            <a:spLocks noGrp="1"/>
+          </p:cNvSpPr>
+          <p:nvPr>
+            <p:ph idx="1"/>
+          </p:nvPr>
+        </p:nvSpPr>
+        <p:spPr/>
+        <p:txBody>
+          <a:bodyPr>
+            <a:normAutofit lnSpcReduction="10000"/>
+          </a:bodyPr>
+          <a:lstStyle/>
+          <a:p>
+            <a:pPr marL="0" indent="0">
+              <a:buNone/>
+            </a:pPr>
+            <a:endParaRPr lang="en-US" dirty="0">
+              <a:latin typeface="HelveticaNeue" panose="00000400000000000000" pitchFamily="2" charset="0"/>
+            </a:endParaRPr>
+          </a:p>
+          <a:p>
+            <a:r>
+              <a:rPr lang="en-US" dirty="0">
+                <a:latin typeface="HelveticaNeue" panose="00000400000000000000" pitchFamily="2" charset="0"/>
+              </a:rPr>
+              <a:t>Expressions are a piece of code that gets evaluated as 1 final value</a:t>
+            </a:r>
+          </a:p>
+          <a:p>
+            <a:endParaRPr lang="en-US" dirty="0">
+              <a:latin typeface="HelveticaNeue" panose="00000400000000000000" pitchFamily="2" charset="0"/>
+            </a:endParaRPr>
+          </a:p>
+          <a:p>
+            <a:pPr marL="0" indent="0">
+              <a:buNone/>
+            </a:pPr>
+            <a:r>
+              <a:rPr lang="en-US" b="1" dirty="0" err="1">
+                <a:latin typeface="HelveticaNeue" panose="00000400000000000000" pitchFamily="2" charset="0"/>
+              </a:rPr>
+              <a:t>a+b</a:t>
+            </a:r>
+            <a:endParaRPr lang="en-US" b="1" dirty="0">
+              <a:latin typeface="HelveticaNeue" panose="00000400000000000000" pitchFamily="2" charset="0"/>
+            </a:endParaRPr>
+          </a:p>
+          <a:p>
+            <a:endParaRPr lang="en-US" b="1" dirty="0">
+              <a:latin typeface="HelveticaNeue" panose="00000400000000000000" pitchFamily="2" charset="0"/>
+            </a:endParaRPr>
+          </a:p>
+          <a:p>
+            <a:pPr marL="0" indent="0">
+              <a:buNone/>
+            </a:pPr>
+            <a:r>
+              <a:rPr lang="en-US" b="1" dirty="0">
+                <a:latin typeface="HelveticaNeue" panose="00000400000000000000" pitchFamily="2" charset="0"/>
+              </a:rPr>
+              <a:t>{</a:t>
+            </a:r>
+          </a:p>
+          <a:p>
+            <a:pPr marL="457200" lvl="1" indent="0">
+              <a:buNone/>
+            </a:pPr>
+            <a:r>
+              <a:rPr lang="en-US" b="1" dirty="0">
+                <a:latin typeface="HelveticaNeue" panose="00000400000000000000" pitchFamily="2" charset="0"/>
+              </a:rPr>
+              <a:t>Print(“Hello”)</a:t>
+            </a:r>
+          </a:p>
+          <a:p>
+            <a:pPr marL="457200" lvl="1" indent="0">
+              <a:buNone/>
+            </a:pPr>
+            <a:r>
+              <a:rPr lang="en-US" b="1" dirty="0">
+                <a:latin typeface="HelveticaNeue" panose="00000400000000000000" pitchFamily="2" charset="0"/>
+              </a:rPr>
+              <a:t>“test”</a:t>
+            </a:r>
+          </a:p>
+          <a:p>
+            <a:pPr marL="0" indent="0">
+              <a:buNone/>
+            </a:pPr>
+            <a:r>
+              <a:rPr lang="en-US" b="1" dirty="0">
+                <a:latin typeface="HelveticaNeue" panose="00000400000000000000" pitchFamily="2" charset="0"/>
+              </a:rPr>
+              <a:t>}</a:t>
+            </a:r>
+          </a:p>
+          <a:p>
+            <a:endParaRPr lang="en-US" dirty="0">
+              <a:latin typeface="HelveticaNeue" panose="00000400000000000000" pitchFamily="2" charset="0"/>
+            </a:endParaRPr>
+          </a:p>
+          <a:p>
+            <a:pPr marL="0" indent="0">
+              <a:buNone/>
+            </a:pPr>
+            <a:endParaRPr lang="en-US" dirty="0"/>
+          </a:p>
+          <a:p>
+            <a:pPr marL="0" indent="0">
+              <a:buNone/>
+            </a:pPr>
+            <a:endParaRPr lang="en-US" dirty="0"/>
           </a:p>
         </p:txBody>
       </p:sp>
     </p:spTree>
     <p:extLst>
       <p:ext uri="{BB962C8B-B14F-4D97-AF65-F5344CB8AC3E}">
-        <p14:creationId xmlns:p14="http://schemas.microsoft.com/office/powerpoint/2010/main" val="1624049891"/>
+        <p14:creationId xmlns:p14="http://schemas.microsoft.com/office/powerpoint/2010/main" val="3874638432"/>
       </p:ext>
     </p:extLst>
   </p:cSld>
   <p:clrMapOvr>
     <a:masterClrMapping/>
   </p:clrMapOvr>
+  <p:timing>
+    <p:tnLst>
+      <p:par>
+        <p:cTn id="1" dur="indefinite" restart="never" nodeType="tmRoot">
+          <p:childTnLst>
+            <p:seq concurrent="1" nextAc="seek">
+              <p:cTn id="2" dur="indefinite" nodeType="mainSeq">
+                <p:childTnLst>
+                  <p:par>
+                    <p:cTn id="3" fill="hold">
+                      <p:stCondLst>
+                        <p:cond delay="indefinite"/>
+                      </p:stCondLst>
+                      <p:childTnLst>
+                        <p:par>
+                          <p:cTn id="4" fill="hold">
+                            <p:stCondLst>
+                              <p:cond delay="0"/>
+                            </p:stCondLst>
+                            <p:childTnLst>
+                              <p:par>
+                                <p:cTn id="5" presetID="1" presetClass="entr" presetSubtype="0" fill="hold" grpId="0" nodeType="clickEffect">
+                                  <p:stCondLst>
+                                    <p:cond delay="0"/>
+                                  </p:stCondLst>
+                                  <p:childTnLst>
+                                    <p:set>
+                                      <p:cBhvr>
+                                        <p:cTn id="6" dur="1" fill="hold">
+                                          <p:stCondLst>
+                                            <p:cond delay="0"/>
+                                          </p:stCondLst>
+                                        </p:cTn>
+                                        <p:tgtEl>
+                                          <p:spTgt spid="3">
+                                            <p:txEl>
+                                              <p:pRg st="1" end="1"/>
+                                            </p:txEl>
+                                          </p:spTgt>
+                                        </p:tgtEl>
+                                        <p:attrNameLst>
+                                          <p:attrName>style.visibility</p:attrName>
+                                        </p:attrNameLst>
+                                      </p:cBhvr>
+                                      <p:to>
+                                        <p:strVal val="visible"/>
+                                      </p:to>
+                                    </p:set>
+                                  </p:childTnLst>
+                                </p:cTn>
+                              </p:par>
+                            </p:childTnLst>
+                          </p:cTn>
+                        </p:par>
+                      </p:childTnLst>
+                    </p:cTn>
+                  </p:par>
+                  <p:par>
+                    <p:cTn id="7" fill="hold">
+                      <p:stCondLst>
+                        <p:cond delay="indefinite"/>
+                      </p:stCondLst>
+                      <p:childTnLst>
+                        <p:par>
+                          <p:cTn id="8" fill="hold">
+                            <p:stCondLst>
+                              <p:cond delay="0"/>
+                            </p:stCondLst>
+                            <p:childTnLst>
+                              <p:par>
+                                <p:cTn id="9" presetID="1" presetClass="entr" presetSubtype="0" fill="hold" grpId="0" nodeType="clickEffect">
+                                  <p:stCondLst>
+                                    <p:cond delay="0"/>
+                                  </p:stCondLst>
+                                  <p:childTnLst>
+                                    <p:set>
+                                      <p:cBhvr>
+                                        <p:cTn id="10" dur="1" fill="hold">
+                                          <p:stCondLst>
+                                            <p:cond delay="0"/>
+                                          </p:stCondLst>
+                                        </p:cTn>
+                                        <p:tgtEl>
+                                          <p:spTgt spid="3">
+                                            <p:txEl>
+                                              <p:pRg st="3" end="3"/>
+                                            </p:txEl>
+                                          </p:spTgt>
+                                        </p:tgtEl>
+                                        <p:attrNameLst>
+                                          <p:attrName>style.visibility</p:attrName>
+                                        </p:attrNameLst>
+                                      </p:cBhvr>
+                                      <p:to>
+                                        <p:strVal val="visible"/>
+                                      </p:to>
+                                    </p:set>
+                                  </p:childTnLst>
+                                </p:cTn>
+                              </p:par>
+                            </p:childTnLst>
+                          </p:cTn>
+                        </p:par>
+                      </p:childTnLst>
+                    </p:cTn>
+                  </p:par>
+                  <p:par>
+                    <p:cTn id="11" fill="hold">
+                      <p:stCondLst>
+                        <p:cond delay="indefinite"/>
+                      </p:stCondLst>
+                      <p:childTnLst>
+                        <p:par>
+                          <p:cTn id="12" fill="hold">
+                            <p:stCondLst>
+                              <p:cond delay="0"/>
+                            </p:stCondLst>
+                            <p:childTnLst>
+                              <p:par>
+                                <p:cTn id="13" presetID="1" presetClass="entr" presetSubtype="0" fill="hold" grpId="0" nodeType="clickEffect">
+                                  <p:stCondLst>
+                                    <p:cond delay="0"/>
+                                  </p:stCondLst>
+                                  <p:childTnLst>
+                                    <p:set>
+                                      <p:cBhvr>
+                                        <p:cTn id="14" dur="1" fill="hold">
+                                          <p:stCondLst>
+                                            <p:cond delay="0"/>
+                                          </p:stCondLst>
+                                        </p:cTn>
+                                        <p:tgtEl>
+                                          <p:spTgt spid="3">
+                                            <p:txEl>
+                                              <p:pRg st="5" end="5"/>
+                                            </p:txEl>
+                                          </p:spTgt>
+                                        </p:tgtEl>
+                                        <p:attrNameLst>
+                                          <p:attrName>style.visibility</p:attrName>
+                                        </p:attrNameLst>
+                                      </p:cBhvr>
+                                      <p:to>
+                                        <p:strVal val="visible"/>
+                                      </p:to>
+                                    </p:set>
+                                  </p:childTnLst>
+                                </p:cTn>
+                              </p:par>
+                              <p:par>
+                                <p:cTn id="15" presetID="1" presetClass="entr" presetSubtype="0" fill="hold" grpId="0" nodeType="withEffect">
+                                  <p:stCondLst>
+                                    <p:cond delay="0"/>
+                                  </p:stCondLst>
+                                  <p:childTnLst>
+                                    <p:set>
+                                      <p:cBhvr>
+                                        <p:cTn id="16" dur="1" fill="hold">
+                                          <p:stCondLst>
+                                            <p:cond delay="0"/>
+                                          </p:stCondLst>
+                                        </p:cTn>
+                                        <p:tgtEl>
+                                          <p:spTgt spid="3">
+                                            <p:txEl>
+                                              <p:pRg st="6" end="6"/>
+                                            </p:txEl>
+                                          </p:spTgt>
+                                        </p:tgtEl>
+                                        <p:attrNameLst>
+                                          <p:attrName>style.visibility</p:attrName>
+                                        </p:attrNameLst>
+                                      </p:cBhvr>
+                                      <p:to>
+                                        <p:strVal val="visible"/>
+                                      </p:to>
+                                    </p:set>
+                                  </p:childTnLst>
+                                </p:cTn>
+                              </p:par>
+                              <p:par>
+                                <p:cTn id="17" presetID="1" presetClass="entr" presetSubtype="0" fill="hold" grpId="0" nodeType="withEffect">
+                                  <p:stCondLst>
+                                    <p:cond delay="0"/>
+                                  </p:stCondLst>
+                                  <p:childTnLst>
+                                    <p:set>
+                                      <p:cBhvr>
+                                        <p:cTn id="18" dur="1" fill="hold">
+                                          <p:stCondLst>
+                                            <p:cond delay="0"/>
+                                          </p:stCondLst>
+                                        </p:cTn>
+                                        <p:tgtEl>
+                                          <p:spTgt spid="3">
+                                            <p:txEl>
+                                              <p:pRg st="7" end="7"/>
+                                            </p:txEl>
+                                          </p:spTgt>
+                                        </p:tgtEl>
+                                        <p:attrNameLst>
+                                          <p:attrName>style.visibility</p:attrName>
+                                        </p:attrNameLst>
+                                      </p:cBhvr>
+                                      <p:to>
+                                        <p:strVal val="visible"/>
+                                      </p:to>
+                                    </p:set>
+                                  </p:childTnLst>
+                                </p:cTn>
+                              </p:par>
+                              <p:par>
+                                <p:cTn id="19" presetID="1" presetClass="entr" presetSubtype="0" fill="hold" grpId="0" nodeType="withEffect">
+                                  <p:stCondLst>
+                                    <p:cond delay="0"/>
+                                  </p:stCondLst>
+                                  <p:childTnLst>
+                                    <p:set>
+                                      <p:cBhvr>
+                                        <p:cTn id="20" dur="1" fill="hold">
+                                          <p:stCondLst>
+                                            <p:cond delay="0"/>
+                                          </p:stCondLst>
+                                        </p:cTn>
+                                        <p:tgtEl>
+                                          <p:spTgt spid="3">
+                                            <p:txEl>
+                                              <p:pRg st="8" end="8"/>
+                                            </p:txEl>
+                                          </p:spTgt>
+                                        </p:tgtEl>
+                                        <p:attrNameLst>
+                                          <p:attrName>style.visibility</p:attrName>
+                                        </p:attrNameLst>
+                                      </p:cBhvr>
+                                      <p:to>
+                                        <p:strVal val="visible"/>
+                                      </p:to>
+                                    </p:set>
+                                  </p:childTnLst>
+                                </p:cTn>
+                              </p:par>
+                            </p:childTnLst>
+                          </p:cTn>
+                        </p:par>
+                      </p:childTnLst>
+                    </p:cTn>
+                  </p:par>
+                </p:childTnLst>
+              </p:cTn>
+              <p:prevCondLst>
+                <p:cond evt="onPrev" delay="0">
+                  <p:tgtEl>
+                    <p:sldTgt/>
+                  </p:tgtEl>
+                </p:cond>
+              </p:prevCondLst>
+              <p:nextCondLst>
+                <p:cond evt="onNext" delay="0">
+                  <p:tgtEl>
+                    <p:sldTgt/>
+                  </p:tgtEl>
+                </p:cond>
+              </p:nextCondLst>
+            </p:seq>
+          </p:childTnLst>
+        </p:cTn>
+      </p:par>
+    </p:tnLst>
+    <p:bldLst>
+      <p:bldP spid="3" grpId="0" uiExpand="1" build="p"/>
+    </p:bldLst>
+  </p:timing>
 </p:sld>
 </file>
 
@@ -16822,6 +18810,184 @@
   <p:clrMapOvr>
     <a:masterClrMapping/>
   </p:clrMapOvr>
+  <p:timing>
+    <p:tnLst>
+      <p:par>
+        <p:cTn id="1" dur="indefinite" restart="never" nodeType="tmRoot">
+          <p:childTnLst>
+            <p:seq concurrent="1" nextAc="seek">
+              <p:cTn id="2" dur="indefinite" nodeType="mainSeq">
+                <p:childTnLst>
+                  <p:par>
+                    <p:cTn id="3" fill="hold">
+                      <p:stCondLst>
+                        <p:cond delay="indefinite"/>
+                      </p:stCondLst>
+                      <p:childTnLst>
+                        <p:par>
+                          <p:cTn id="4" fill="hold">
+                            <p:stCondLst>
+                              <p:cond delay="0"/>
+                            </p:stCondLst>
+                            <p:childTnLst>
+                              <p:par>
+                                <p:cTn id="5" presetID="1" presetClass="entr" presetSubtype="0" fill="hold" grpId="0" nodeType="clickEffect">
+                                  <p:stCondLst>
+                                    <p:cond delay="0"/>
+                                  </p:stCondLst>
+                                  <p:childTnLst>
+                                    <p:set>
+                                      <p:cBhvr>
+                                        <p:cTn id="6" dur="1" fill="hold">
+                                          <p:stCondLst>
+                                            <p:cond delay="0"/>
+                                          </p:stCondLst>
+                                        </p:cTn>
+                                        <p:tgtEl>
+                                          <p:spTgt spid="7"/>
+                                        </p:tgtEl>
+                                        <p:attrNameLst>
+                                          <p:attrName>style.visibility</p:attrName>
+                                        </p:attrNameLst>
+                                      </p:cBhvr>
+                                      <p:to>
+                                        <p:strVal val="visible"/>
+                                      </p:to>
+                                    </p:set>
+                                  </p:childTnLst>
+                                </p:cTn>
+                              </p:par>
+                              <p:par>
+                                <p:cTn id="7" presetID="1" presetClass="entr" presetSubtype="0" fill="hold" nodeType="withEffect">
+                                  <p:stCondLst>
+                                    <p:cond delay="0"/>
+                                  </p:stCondLst>
+                                  <p:childTnLst>
+                                    <p:set>
+                                      <p:cBhvr>
+                                        <p:cTn id="8" dur="1" fill="hold">
+                                          <p:stCondLst>
+                                            <p:cond delay="0"/>
+                                          </p:stCondLst>
+                                        </p:cTn>
+                                        <p:tgtEl>
+                                          <p:spTgt spid="4"/>
+                                        </p:tgtEl>
+                                        <p:attrNameLst>
+                                          <p:attrName>style.visibility</p:attrName>
+                                        </p:attrNameLst>
+                                      </p:cBhvr>
+                                      <p:to>
+                                        <p:strVal val="visible"/>
+                                      </p:to>
+                                    </p:set>
+                                  </p:childTnLst>
+                                </p:cTn>
+                              </p:par>
+                            </p:childTnLst>
+                          </p:cTn>
+                        </p:par>
+                      </p:childTnLst>
+                    </p:cTn>
+                  </p:par>
+                  <p:par>
+                    <p:cTn id="9" fill="hold">
+                      <p:stCondLst>
+                        <p:cond delay="indefinite"/>
+                      </p:stCondLst>
+                      <p:childTnLst>
+                        <p:par>
+                          <p:cTn id="10" fill="hold">
+                            <p:stCondLst>
+                              <p:cond delay="0"/>
+                            </p:stCondLst>
+                            <p:childTnLst>
+                              <p:par>
+                                <p:cTn id="11" presetID="1" presetClass="entr" presetSubtype="0" fill="hold" grpId="0" nodeType="clickEffect">
+                                  <p:stCondLst>
+                                    <p:cond delay="0"/>
+                                  </p:stCondLst>
+                                  <p:childTnLst>
+                                    <p:set>
+                                      <p:cBhvr>
+                                        <p:cTn id="12" dur="1" fill="hold">
+                                          <p:stCondLst>
+                                            <p:cond delay="0"/>
+                                          </p:stCondLst>
+                                        </p:cTn>
+                                        <p:tgtEl>
+                                          <p:spTgt spid="8"/>
+                                        </p:tgtEl>
+                                        <p:attrNameLst>
+                                          <p:attrName>style.visibility</p:attrName>
+                                        </p:attrNameLst>
+                                      </p:cBhvr>
+                                      <p:to>
+                                        <p:strVal val="visible"/>
+                                      </p:to>
+                                    </p:set>
+                                  </p:childTnLst>
+                                </p:cTn>
+                              </p:par>
+                              <p:par>
+                                <p:cTn id="13" presetID="1" presetClass="entr" presetSubtype="0" fill="hold" nodeType="withEffect">
+                                  <p:stCondLst>
+                                    <p:cond delay="0"/>
+                                  </p:stCondLst>
+                                  <p:childTnLst>
+                                    <p:set>
+                                      <p:cBhvr>
+                                        <p:cTn id="14" dur="1" fill="hold">
+                                          <p:stCondLst>
+                                            <p:cond delay="0"/>
+                                          </p:stCondLst>
+                                        </p:cTn>
+                                        <p:tgtEl>
+                                          <p:spTgt spid="5"/>
+                                        </p:tgtEl>
+                                        <p:attrNameLst>
+                                          <p:attrName>style.visibility</p:attrName>
+                                        </p:attrNameLst>
+                                      </p:cBhvr>
+                                      <p:to>
+                                        <p:strVal val="visible"/>
+                                      </p:to>
+                                    </p:set>
+                                  </p:childTnLst>
+                                </p:cTn>
+                              </p:par>
+                            </p:childTnLst>
+                          </p:cTn>
+                        </p:par>
+                      </p:childTnLst>
+                    </p:cTn>
+                  </p:par>
+                </p:childTnLst>
+              </p:cTn>
+              <p:prevCondLst>
+                <p:cond evt="onPrev" delay="0">
+                  <p:tgtEl>
+                    <p:sldTgt/>
+                  </p:tgtEl>
+                </p:cond>
+              </p:prevCondLst>
+              <p:nextCondLst>
+                <p:cond evt="onNext" delay="0">
+                  <p:tgtEl>
+                    <p:sldTgt/>
+                  </p:tgtEl>
+                </p:cond>
+              </p:nextCondLst>
+            </p:seq>
+          </p:childTnLst>
+        </p:cTn>
+      </p:par>
+    </p:tnLst>
+    <p:bldLst>
+      <p:bldP spid="7" grpId="0"/>
+      <p:bldP spid="8" grpId="0"/>
+    </p:bldLst>
+  </p:timing>
 </p:sld>
 </file>
 
@@ -17067,6 +19233,157 @@
   <p:clrMapOvr>
     <a:masterClrMapping/>
   </p:clrMapOvr>
+  <p:timing>
+    <p:tnLst>
+      <p:par>
+        <p:cTn id="1" dur="indefinite" restart="never" nodeType="tmRoot">
+          <p:childTnLst>
+            <p:seq concurrent="1" nextAc="seek">
+              <p:cTn id="2" dur="indefinite" nodeType="mainSeq">
+                <p:childTnLst>
+                  <p:par>
+                    <p:cTn id="3" fill="hold">
+                      <p:stCondLst>
+                        <p:cond delay="indefinite"/>
+                      </p:stCondLst>
+                      <p:childTnLst>
+                        <p:par>
+                          <p:cTn id="4" fill="hold">
+                            <p:stCondLst>
+                              <p:cond delay="0"/>
+                            </p:stCondLst>
+                            <p:childTnLst>
+                              <p:par>
+                                <p:cTn id="5" presetID="1" presetClass="entr" presetSubtype="0" fill="hold" grpId="0" nodeType="clickEffect">
+                                  <p:stCondLst>
+                                    <p:cond delay="0"/>
+                                  </p:stCondLst>
+                                  <p:childTnLst>
+                                    <p:set>
+                                      <p:cBhvr>
+                                        <p:cTn id="6" dur="1" fill="hold">
+                                          <p:stCondLst>
+                                            <p:cond delay="0"/>
+                                          </p:stCondLst>
+                                        </p:cTn>
+                                        <p:tgtEl>
+                                          <p:spTgt spid="7"/>
+                                        </p:tgtEl>
+                                        <p:attrNameLst>
+                                          <p:attrName>style.visibility</p:attrName>
+                                        </p:attrNameLst>
+                                      </p:cBhvr>
+                                      <p:to>
+                                        <p:strVal val="visible"/>
+                                      </p:to>
+                                    </p:set>
+                                  </p:childTnLst>
+                                </p:cTn>
+                              </p:par>
+                              <p:par>
+                                <p:cTn id="7" presetID="1" presetClass="entr" presetSubtype="0" fill="hold" nodeType="withEffect">
+                                  <p:stCondLst>
+                                    <p:cond delay="0"/>
+                                  </p:stCondLst>
+                                  <p:childTnLst>
+                                    <p:set>
+                                      <p:cBhvr>
+                                        <p:cTn id="8" dur="1" fill="hold">
+                                          <p:stCondLst>
+                                            <p:cond delay="0"/>
+                                          </p:stCondLst>
+                                        </p:cTn>
+                                        <p:tgtEl>
+                                          <p:spTgt spid="6"/>
+                                        </p:tgtEl>
+                                        <p:attrNameLst>
+                                          <p:attrName>style.visibility</p:attrName>
+                                        </p:attrNameLst>
+                                      </p:cBhvr>
+                                      <p:to>
+                                        <p:strVal val="visible"/>
+                                      </p:to>
+                                    </p:set>
+                                  </p:childTnLst>
+                                </p:cTn>
+                              </p:par>
+                            </p:childTnLst>
+                          </p:cTn>
+                        </p:par>
+                      </p:childTnLst>
+                    </p:cTn>
+                  </p:par>
+                  <p:par>
+                    <p:cTn id="9" fill="hold">
+                      <p:stCondLst>
+                        <p:cond delay="indefinite"/>
+                      </p:stCondLst>
+                      <p:childTnLst>
+                        <p:par>
+                          <p:cTn id="10" fill="hold">
+                            <p:stCondLst>
+                              <p:cond delay="0"/>
+                            </p:stCondLst>
+                            <p:childTnLst>
+                              <p:par>
+                                <p:cTn id="11" presetID="1" presetClass="entr" presetSubtype="0" fill="hold" grpId="0" nodeType="clickEffect">
+                                  <p:stCondLst>
+                                    <p:cond delay="0"/>
+                                  </p:stCondLst>
+                                  <p:childTnLst>
+                                    <p:set>
+                                      <p:cBhvr>
+                                        <p:cTn id="12" dur="1" fill="hold">
+                                          <p:stCondLst>
+                                            <p:cond delay="0"/>
+                                          </p:stCondLst>
+                                        </p:cTn>
+                                        <p:tgtEl>
+                                          <p:spTgt spid="8"/>
+                                        </p:tgtEl>
+                                        <p:attrNameLst>
+                                          <p:attrName>style.visibility</p:attrName>
+                                        </p:attrNameLst>
+                                      </p:cBhvr>
+                                      <p:to>
+                                        <p:strVal val="visible"/>
+                                      </p:to>
+                                    </p:set>
+                                  </p:childTnLst>
+                                </p:cTn>
+                              </p:par>
+                            </p:childTnLst>
+                          </p:cTn>
+                        </p:par>
+                      </p:childTnLst>
+                    </p:cTn>
+                  </p:par>
+                </p:childTnLst>
+              </p:cTn>
+              <p:prevCondLst>
+                <p:cond evt="onPrev" delay="0">
+                  <p:tgtEl>
+                    <p:sldTgt/>
+                  </p:tgtEl>
+                </p:cond>
+              </p:prevCondLst>
+              <p:nextCondLst>
+                <p:cond evt="onNext" delay="0">
+                  <p:tgtEl>
+                    <p:sldTgt/>
+                  </p:tgtEl>
+                </p:cond>
+              </p:nextCondLst>
+            </p:seq>
+          </p:childTnLst>
+        </p:cTn>
+      </p:par>
+    </p:tnLst>
+    <p:bldLst>
+      <p:bldP spid="7" grpId="0"/>
+      <p:bldP spid="8" grpId="0"/>
+    </p:bldLst>
+  </p:timing>
 </p:sld>
 </file>
 
@@ -17480,6 +19797,156 @@
   <p:clrMapOvr>
     <a:masterClrMapping/>
   </p:clrMapOvr>
+  <p:timing>
+    <p:tnLst>
+      <p:par>
+        <p:cTn id="1" dur="indefinite" restart="never" nodeType="tmRoot">
+          <p:childTnLst>
+            <p:seq concurrent="1" nextAc="seek">
+              <p:cTn id="2" dur="indefinite" nodeType="mainSeq">
+                <p:childTnLst>
+                  <p:par>
+                    <p:cTn id="3" fill="hold">
+                      <p:stCondLst>
+                        <p:cond delay="indefinite"/>
+                      </p:stCondLst>
+                      <p:childTnLst>
+                        <p:par>
+                          <p:cTn id="4" fill="hold">
+                            <p:stCondLst>
+                              <p:cond delay="0"/>
+                            </p:stCondLst>
+                            <p:childTnLst>
+                              <p:par>
+                                <p:cTn id="5" presetID="1" presetClass="entr" presetSubtype="0" fill="hold" nodeType="clickEffect">
+                                  <p:stCondLst>
+                                    <p:cond delay="0"/>
+                                  </p:stCondLst>
+                                  <p:childTnLst>
+                                    <p:set>
+                                      <p:cBhvr>
+                                        <p:cTn id="6" dur="1" fill="hold">
+                                          <p:stCondLst>
+                                            <p:cond delay="0"/>
+                                          </p:stCondLst>
+                                        </p:cTn>
+                                        <p:tgtEl>
+                                          <p:spTgt spid="5"/>
+                                        </p:tgtEl>
+                                        <p:attrNameLst>
+                                          <p:attrName>style.visibility</p:attrName>
+                                        </p:attrNameLst>
+                                      </p:cBhvr>
+                                      <p:to>
+                                        <p:strVal val="visible"/>
+                                      </p:to>
+                                    </p:set>
+                                  </p:childTnLst>
+                                </p:cTn>
+                              </p:par>
+                            </p:childTnLst>
+                          </p:cTn>
+                        </p:par>
+                      </p:childTnLst>
+                    </p:cTn>
+                  </p:par>
+                  <p:par>
+                    <p:cTn id="7" fill="hold">
+                      <p:stCondLst>
+                        <p:cond delay="indefinite"/>
+                      </p:stCondLst>
+                      <p:childTnLst>
+                        <p:par>
+                          <p:cTn id="8" fill="hold">
+                            <p:stCondLst>
+                              <p:cond delay="0"/>
+                            </p:stCondLst>
+                            <p:childTnLst>
+                              <p:par>
+                                <p:cTn id="9" presetID="1" presetClass="entr" presetSubtype="0" fill="hold" grpId="0" nodeType="clickEffect">
+                                  <p:stCondLst>
+                                    <p:cond delay="0"/>
+                                  </p:stCondLst>
+                                  <p:childTnLst>
+                                    <p:set>
+                                      <p:cBhvr>
+                                        <p:cTn id="10" dur="1" fill="hold">
+                                          <p:stCondLst>
+                                            <p:cond delay="0"/>
+                                          </p:stCondLst>
+                                        </p:cTn>
+                                        <p:tgtEl>
+                                          <p:spTgt spid="9"/>
+                                        </p:tgtEl>
+                                        <p:attrNameLst>
+                                          <p:attrName>style.visibility</p:attrName>
+                                        </p:attrNameLst>
+                                      </p:cBhvr>
+                                      <p:to>
+                                        <p:strVal val="visible"/>
+                                      </p:to>
+                                    </p:set>
+                                  </p:childTnLst>
+                                </p:cTn>
+                              </p:par>
+                              <p:par>
+                                <p:cTn id="11" presetID="1" presetClass="entr" presetSubtype="0" fill="hold" nodeType="withEffect">
+                                  <p:stCondLst>
+                                    <p:cond delay="0"/>
+                                  </p:stCondLst>
+                                  <p:childTnLst>
+                                    <p:set>
+                                      <p:cBhvr>
+                                        <p:cTn id="12" dur="1" fill="hold">
+                                          <p:stCondLst>
+                                            <p:cond delay="0"/>
+                                          </p:stCondLst>
+                                        </p:cTn>
+                                        <p:tgtEl>
+                                          <p:spTgt spid="7"/>
+                                        </p:tgtEl>
+                                        <p:attrNameLst>
+                                          <p:attrName>style.visibility</p:attrName>
+                                        </p:attrNameLst>
+                                      </p:cBhvr>
+                                      <p:to>
+                                        <p:strVal val="visible"/>
+                                      </p:to>
+                                    </p:set>
+                                  </p:childTnLst>
+                                </p:cTn>
+                              </p:par>
+                            </p:childTnLst>
+                          </p:cTn>
+                        </p:par>
+                      </p:childTnLst>
+                    </p:cTn>
+                  </p:par>
+                </p:childTnLst>
+              </p:cTn>
+              <p:prevCondLst>
+                <p:cond evt="onPrev" delay="0">
+                  <p:tgtEl>
+                    <p:sldTgt/>
+                  </p:tgtEl>
+                </p:cond>
+              </p:prevCondLst>
+              <p:nextCondLst>
+                <p:cond evt="onNext" delay="0">
+                  <p:tgtEl>
+                    <p:sldTgt/>
+                  </p:tgtEl>
+                </p:cond>
+              </p:nextCondLst>
+            </p:seq>
+          </p:childTnLst>
+        </p:cTn>
+      </p:par>
+    </p:tnLst>
+    <p:bldLst>
+      <p:bldP spid="9" grpId="0"/>
+    </p:bldLst>
+  </p:timing>
 </p:sld>
 </file>
 

</xml_diff>